<commit_message>
Revised Figures based on feedback and new results
</commit_message>
<xml_diff>
--- a/output/figures/components/figure_3.pptx
+++ b/output/figures/components/figure_3.pptx
@@ -2,7 +2,7 @@
 <file path=ppt/presentation.xml><?xml version="1.0" encoding="utf-8"?>
 <p:presentation xmlns:a="http://schemas.openxmlformats.org/drawingml/2006/main" xmlns:r="http://schemas.openxmlformats.org/officeDocument/2006/relationships" xmlns:p="http://schemas.openxmlformats.org/presentationml/2006/main" saveSubsetFonts="1" autoCompressPictures="0">
   <p:sldMasterIdLst>
-    <p:sldMasterId id="2147483816" r:id="rId1"/>
+    <p:sldMasterId id="2147483864" r:id="rId1"/>
   </p:sldMasterIdLst>
   <p:notesMasterIdLst>
     <p:notesMasterId r:id="rId3"/>
@@ -10,7 +10,7 @@
   <p:sldIdLst>
     <p:sldId id="256" r:id="rId2"/>
   </p:sldIdLst>
-  <p:sldSz cx="5943600" cy="5486400"/>
+  <p:sldSz cx="3840163" cy="6400800"/>
   <p:notesSz cx="6858000" cy="9144000"/>
   <p:defaultTextStyle>
     <a:defPPr>
@@ -197,7 +197,7 @@
           <a:p>
             <a:fld id="{A16B860A-9A1A-144A-96A5-5B32CEA06BBF}" type="datetimeFigureOut">
               <a:rPr lang="en-US" smtClean="0"/>
-              <a:t>12/16/22</a:t>
+              <a:t>2/15/23</a:t>
             </a:fld>
             <a:endParaRPr lang="en-US"/>
           </a:p>
@@ -215,8 +215,8 @@
         </p:nvSpPr>
         <p:spPr>
           <a:xfrm>
-            <a:off x="1757363" y="1143000"/>
-            <a:ext cx="3343275" cy="3086100"/>
+            <a:off x="2503488" y="1143000"/>
+            <a:ext cx="1851025" cy="3086100"/>
           </a:xfrm>
           <a:prstGeom prst="rect">
             <a:avLst/>
@@ -493,8 +493,8 @@
         </p:nvSpPr>
         <p:spPr>
           <a:xfrm>
-            <a:off x="1757363" y="1143000"/>
-            <a:ext cx="3343275" cy="3086100"/>
+            <a:off x="2503488" y="1143000"/>
+            <a:ext cx="1851025" cy="3086100"/>
           </a:xfrm>
         </p:spPr>
       </p:sp>
@@ -582,15 +582,15 @@
         </p:nvSpPr>
         <p:spPr>
           <a:xfrm>
-            <a:off x="445770" y="897890"/>
-            <a:ext cx="5052060" cy="1910080"/>
+            <a:off x="288012" y="1047539"/>
+            <a:ext cx="3264139" cy="2228427"/>
           </a:xfrm>
         </p:spPr>
         <p:txBody>
           <a:bodyPr anchor="b"/>
           <a:lstStyle>
             <a:lvl1pPr algn="ctr">
-              <a:defRPr sz="3900"/>
+              <a:defRPr sz="2520"/>
             </a:lvl1pPr>
           </a:lstStyle>
           <a:p>
@@ -614,8 +614,8 @@
         </p:nvSpPr>
         <p:spPr>
           <a:xfrm>
-            <a:off x="742950" y="2881630"/>
-            <a:ext cx="4457700" cy="1324610"/>
+            <a:off x="480021" y="3361902"/>
+            <a:ext cx="2880122" cy="1545378"/>
           </a:xfrm>
         </p:spPr>
         <p:txBody>
@@ -623,39 +623,39 @@
           <a:lstStyle>
             <a:lvl1pPr marL="0" indent="0" algn="ctr">
               <a:buNone/>
-              <a:defRPr sz="1560"/>
+              <a:defRPr sz="1008"/>
             </a:lvl1pPr>
-            <a:lvl2pPr marL="297180" indent="0" algn="ctr">
-              <a:buNone/>
-              <a:defRPr sz="1300"/>
+            <a:lvl2pPr marL="192024" indent="0" algn="ctr">
+              <a:buNone/>
+              <a:defRPr sz="840"/>
             </a:lvl2pPr>
-            <a:lvl3pPr marL="594360" indent="0" algn="ctr">
-              <a:buNone/>
-              <a:defRPr sz="1170"/>
+            <a:lvl3pPr marL="384048" indent="0" algn="ctr">
+              <a:buNone/>
+              <a:defRPr sz="756"/>
             </a:lvl3pPr>
-            <a:lvl4pPr marL="891540" indent="0" algn="ctr">
-              <a:buNone/>
-              <a:defRPr sz="1040"/>
+            <a:lvl4pPr marL="576072" indent="0" algn="ctr">
+              <a:buNone/>
+              <a:defRPr sz="672"/>
             </a:lvl4pPr>
-            <a:lvl5pPr marL="1188720" indent="0" algn="ctr">
-              <a:buNone/>
-              <a:defRPr sz="1040"/>
+            <a:lvl5pPr marL="768096" indent="0" algn="ctr">
+              <a:buNone/>
+              <a:defRPr sz="672"/>
             </a:lvl5pPr>
-            <a:lvl6pPr marL="1485900" indent="0" algn="ctr">
-              <a:buNone/>
-              <a:defRPr sz="1040"/>
+            <a:lvl6pPr marL="960120" indent="0" algn="ctr">
+              <a:buNone/>
+              <a:defRPr sz="672"/>
             </a:lvl6pPr>
-            <a:lvl7pPr marL="1783080" indent="0" algn="ctr">
-              <a:buNone/>
-              <a:defRPr sz="1040"/>
+            <a:lvl7pPr marL="1152144" indent="0" algn="ctr">
+              <a:buNone/>
+              <a:defRPr sz="672"/>
             </a:lvl7pPr>
-            <a:lvl8pPr marL="2080260" indent="0" algn="ctr">
-              <a:buNone/>
-              <a:defRPr sz="1040"/>
+            <a:lvl8pPr marL="1344168" indent="0" algn="ctr">
+              <a:buNone/>
+              <a:defRPr sz="672"/>
             </a:lvl8pPr>
-            <a:lvl9pPr marL="2377440" indent="0" algn="ctr">
-              <a:buNone/>
-              <a:defRPr sz="1040"/>
+            <a:lvl9pPr marL="1536192" indent="0" algn="ctr">
+              <a:buNone/>
+              <a:defRPr sz="672"/>
             </a:lvl9pPr>
           </a:lstStyle>
           <a:p>
@@ -684,7 +684,7 @@
           <a:p>
             <a:fld id="{E053DD94-EF7D-4B46-90DA-1D86C84E35B6}" type="datetimeFigureOut">
               <a:rPr lang="en-US" smtClean="0"/>
-              <a:t>12/16/22</a:t>
+              <a:t>2/15/23</a:t>
             </a:fld>
             <a:endParaRPr lang="en-US"/>
           </a:p>
@@ -735,7 +735,7 @@
     </p:spTree>
     <p:extLst>
       <p:ext uri="{BB962C8B-B14F-4D97-AF65-F5344CB8AC3E}">
-        <p14:creationId xmlns:p14="http://schemas.microsoft.com/office/powerpoint/2010/main" val="468931913"/>
+        <p14:creationId xmlns:p14="http://schemas.microsoft.com/office/powerpoint/2010/main" val="2931911268"/>
       </p:ext>
     </p:extLst>
   </p:cSld>
@@ -854,7 +854,7 @@
           <a:p>
             <a:fld id="{E053DD94-EF7D-4B46-90DA-1D86C84E35B6}" type="datetimeFigureOut">
               <a:rPr lang="en-US" smtClean="0"/>
-              <a:t>12/16/22</a:t>
+              <a:t>2/15/23</a:t>
             </a:fld>
             <a:endParaRPr lang="en-US"/>
           </a:p>
@@ -905,7 +905,7 @@
     </p:spTree>
     <p:extLst>
       <p:ext uri="{BB962C8B-B14F-4D97-AF65-F5344CB8AC3E}">
-        <p14:creationId xmlns:p14="http://schemas.microsoft.com/office/powerpoint/2010/main" val="116188669"/>
+        <p14:creationId xmlns:p14="http://schemas.microsoft.com/office/powerpoint/2010/main" val="504805210"/>
       </p:ext>
     </p:extLst>
   </p:cSld>
@@ -944,8 +944,8 @@
         </p:nvSpPr>
         <p:spPr>
           <a:xfrm>
-            <a:off x="4253389" y="292100"/>
-            <a:ext cx="1281589" cy="4649470"/>
+            <a:off x="2748117" y="340783"/>
+            <a:ext cx="828035" cy="5424382"/>
           </a:xfrm>
         </p:spPr>
         <p:txBody>
@@ -972,8 +972,8 @@
         </p:nvSpPr>
         <p:spPr>
           <a:xfrm>
-            <a:off x="408623" y="292100"/>
-            <a:ext cx="3770471" cy="4649470"/>
+            <a:off x="264012" y="340783"/>
+            <a:ext cx="2436103" cy="5424382"/>
           </a:xfrm>
         </p:spPr>
         <p:txBody>
@@ -1034,7 +1034,7 @@
           <a:p>
             <a:fld id="{E053DD94-EF7D-4B46-90DA-1D86C84E35B6}" type="datetimeFigureOut">
               <a:rPr lang="en-US" smtClean="0"/>
-              <a:t>12/16/22</a:t>
+              <a:t>2/15/23</a:t>
             </a:fld>
             <a:endParaRPr lang="en-US"/>
           </a:p>
@@ -1085,7 +1085,7 @@
     </p:spTree>
     <p:extLst>
       <p:ext uri="{BB962C8B-B14F-4D97-AF65-F5344CB8AC3E}">
-        <p14:creationId xmlns:p14="http://schemas.microsoft.com/office/powerpoint/2010/main" val="38742949"/>
+        <p14:creationId xmlns:p14="http://schemas.microsoft.com/office/powerpoint/2010/main" val="125101152"/>
       </p:ext>
     </p:extLst>
   </p:cSld>
@@ -1204,7 +1204,7 @@
           <a:p>
             <a:fld id="{E053DD94-EF7D-4B46-90DA-1D86C84E35B6}" type="datetimeFigureOut">
               <a:rPr lang="en-US" smtClean="0"/>
-              <a:t>12/16/22</a:t>
+              <a:t>2/15/23</a:t>
             </a:fld>
             <a:endParaRPr lang="en-US"/>
           </a:p>
@@ -1255,7 +1255,7 @@
     </p:spTree>
     <p:extLst>
       <p:ext uri="{BB962C8B-B14F-4D97-AF65-F5344CB8AC3E}">
-        <p14:creationId xmlns:p14="http://schemas.microsoft.com/office/powerpoint/2010/main" val="3745103251"/>
+        <p14:creationId xmlns:p14="http://schemas.microsoft.com/office/powerpoint/2010/main" val="2393009480"/>
       </p:ext>
     </p:extLst>
   </p:cSld>
@@ -1294,15 +1294,15 @@
         </p:nvSpPr>
         <p:spPr>
           <a:xfrm>
-            <a:off x="405527" y="1367791"/>
-            <a:ext cx="5126355" cy="2282190"/>
+            <a:off x="262011" y="1595757"/>
+            <a:ext cx="3312141" cy="2662555"/>
           </a:xfrm>
         </p:spPr>
         <p:txBody>
           <a:bodyPr anchor="b"/>
           <a:lstStyle>
             <a:lvl1pPr>
-              <a:defRPr sz="3900"/>
+              <a:defRPr sz="2520"/>
             </a:lvl1pPr>
           </a:lstStyle>
           <a:p>
@@ -1326,8 +1326,8 @@
         </p:nvSpPr>
         <p:spPr>
           <a:xfrm>
-            <a:off x="405527" y="3671571"/>
-            <a:ext cx="5126355" cy="1200150"/>
+            <a:off x="262011" y="4283500"/>
+            <a:ext cx="3312141" cy="1400175"/>
           </a:xfrm>
         </p:spPr>
         <p:txBody>
@@ -1335,15 +1335,15 @@
           <a:lstStyle>
             <a:lvl1pPr marL="0" indent="0">
               <a:buNone/>
-              <a:defRPr sz="1560">
+              <a:defRPr sz="1008">
                 <a:solidFill>
                   <a:schemeClr val="tx1"/>
                 </a:solidFill>
               </a:defRPr>
             </a:lvl1pPr>
-            <a:lvl2pPr marL="297180" indent="0">
-              <a:buNone/>
-              <a:defRPr sz="1300">
+            <a:lvl2pPr marL="192024" indent="0">
+              <a:buNone/>
+              <a:defRPr sz="840">
                 <a:solidFill>
                   <a:schemeClr val="tx1">
                     <a:tint val="75000"/>
@@ -1351,9 +1351,9 @@
                 </a:solidFill>
               </a:defRPr>
             </a:lvl2pPr>
-            <a:lvl3pPr marL="594360" indent="0">
-              <a:buNone/>
-              <a:defRPr sz="1170">
+            <a:lvl3pPr marL="384048" indent="0">
+              <a:buNone/>
+              <a:defRPr sz="756">
                 <a:solidFill>
                   <a:schemeClr val="tx1">
                     <a:tint val="75000"/>
@@ -1361,9 +1361,9 @@
                 </a:solidFill>
               </a:defRPr>
             </a:lvl3pPr>
-            <a:lvl4pPr marL="891540" indent="0">
-              <a:buNone/>
-              <a:defRPr sz="1040">
+            <a:lvl4pPr marL="576072" indent="0">
+              <a:buNone/>
+              <a:defRPr sz="672">
                 <a:solidFill>
                   <a:schemeClr val="tx1">
                     <a:tint val="75000"/>
@@ -1371,9 +1371,9 @@
                 </a:solidFill>
               </a:defRPr>
             </a:lvl4pPr>
-            <a:lvl5pPr marL="1188720" indent="0">
-              <a:buNone/>
-              <a:defRPr sz="1040">
+            <a:lvl5pPr marL="768096" indent="0">
+              <a:buNone/>
+              <a:defRPr sz="672">
                 <a:solidFill>
                   <a:schemeClr val="tx1">
                     <a:tint val="75000"/>
@@ -1381,9 +1381,9 @@
                 </a:solidFill>
               </a:defRPr>
             </a:lvl5pPr>
-            <a:lvl6pPr marL="1485900" indent="0">
-              <a:buNone/>
-              <a:defRPr sz="1040">
+            <a:lvl6pPr marL="960120" indent="0">
+              <a:buNone/>
+              <a:defRPr sz="672">
                 <a:solidFill>
                   <a:schemeClr val="tx1">
                     <a:tint val="75000"/>
@@ -1391,9 +1391,9 @@
                 </a:solidFill>
               </a:defRPr>
             </a:lvl6pPr>
-            <a:lvl7pPr marL="1783080" indent="0">
-              <a:buNone/>
-              <a:defRPr sz="1040">
+            <a:lvl7pPr marL="1152144" indent="0">
+              <a:buNone/>
+              <a:defRPr sz="672">
                 <a:solidFill>
                   <a:schemeClr val="tx1">
                     <a:tint val="75000"/>
@@ -1401,9 +1401,9 @@
                 </a:solidFill>
               </a:defRPr>
             </a:lvl7pPr>
-            <a:lvl8pPr marL="2080260" indent="0">
-              <a:buNone/>
-              <a:defRPr sz="1040">
+            <a:lvl8pPr marL="1344168" indent="0">
+              <a:buNone/>
+              <a:defRPr sz="672">
                 <a:solidFill>
                   <a:schemeClr val="tx1">
                     <a:tint val="75000"/>
@@ -1411,9 +1411,9 @@
                 </a:solidFill>
               </a:defRPr>
             </a:lvl8pPr>
-            <a:lvl9pPr marL="2377440" indent="0">
-              <a:buNone/>
-              <a:defRPr sz="1040">
+            <a:lvl9pPr marL="1536192" indent="0">
+              <a:buNone/>
+              <a:defRPr sz="672">
                 <a:solidFill>
                   <a:schemeClr val="tx1">
                     <a:tint val="75000"/>
@@ -1448,7 +1448,7 @@
           <a:p>
             <a:fld id="{E053DD94-EF7D-4B46-90DA-1D86C84E35B6}" type="datetimeFigureOut">
               <a:rPr lang="en-US" smtClean="0"/>
-              <a:t>12/16/22</a:t>
+              <a:t>2/15/23</a:t>
             </a:fld>
             <a:endParaRPr lang="en-US"/>
           </a:p>
@@ -1499,7 +1499,7 @@
     </p:spTree>
     <p:extLst>
       <p:ext uri="{BB962C8B-B14F-4D97-AF65-F5344CB8AC3E}">
-        <p14:creationId xmlns:p14="http://schemas.microsoft.com/office/powerpoint/2010/main" val="2364207032"/>
+        <p14:creationId xmlns:p14="http://schemas.microsoft.com/office/powerpoint/2010/main" val="377351752"/>
       </p:ext>
     </p:extLst>
   </p:cSld>
@@ -1561,8 +1561,8 @@
         </p:nvSpPr>
         <p:spPr>
           <a:xfrm>
-            <a:off x="408623" y="1460500"/>
-            <a:ext cx="2526030" cy="3481070"/>
+            <a:off x="264011" y="1703917"/>
+            <a:ext cx="1632069" cy="4061249"/>
           </a:xfrm>
         </p:spPr>
         <p:txBody>
@@ -1618,8 +1618,8 @@
         </p:nvSpPr>
         <p:spPr>
           <a:xfrm>
-            <a:off x="3008948" y="1460500"/>
-            <a:ext cx="2526030" cy="3481070"/>
+            <a:off x="1944083" y="1703917"/>
+            <a:ext cx="1632069" cy="4061249"/>
           </a:xfrm>
         </p:spPr>
         <p:txBody>
@@ -1680,7 +1680,7 @@
           <a:p>
             <a:fld id="{E053DD94-EF7D-4B46-90DA-1D86C84E35B6}" type="datetimeFigureOut">
               <a:rPr lang="en-US" smtClean="0"/>
-              <a:t>12/16/22</a:t>
+              <a:t>2/15/23</a:t>
             </a:fld>
             <a:endParaRPr lang="en-US"/>
           </a:p>
@@ -1731,7 +1731,7 @@
     </p:spTree>
     <p:extLst>
       <p:ext uri="{BB962C8B-B14F-4D97-AF65-F5344CB8AC3E}">
-        <p14:creationId xmlns:p14="http://schemas.microsoft.com/office/powerpoint/2010/main" val="1589398716"/>
+        <p14:creationId xmlns:p14="http://schemas.microsoft.com/office/powerpoint/2010/main" val="4102861439"/>
       </p:ext>
     </p:extLst>
   </p:cSld>
@@ -1770,8 +1770,8 @@
         </p:nvSpPr>
         <p:spPr>
           <a:xfrm>
-            <a:off x="409397" y="292101"/>
-            <a:ext cx="5126355" cy="1060450"/>
+            <a:off x="264511" y="340785"/>
+            <a:ext cx="3312141" cy="1237192"/>
           </a:xfrm>
         </p:spPr>
         <p:txBody>
@@ -1798,8 +1798,8 @@
         </p:nvSpPr>
         <p:spPr>
           <a:xfrm>
-            <a:off x="409397" y="1344930"/>
-            <a:ext cx="2514421" cy="659130"/>
+            <a:off x="264512" y="1569085"/>
+            <a:ext cx="1624569" cy="768985"/>
           </a:xfrm>
         </p:spPr>
         <p:txBody>
@@ -1807,39 +1807,39 @@
           <a:lstStyle>
             <a:lvl1pPr marL="0" indent="0">
               <a:buNone/>
-              <a:defRPr sz="1560" b="1"/>
+              <a:defRPr sz="1008" b="1"/>
             </a:lvl1pPr>
-            <a:lvl2pPr marL="297180" indent="0">
-              <a:buNone/>
-              <a:defRPr sz="1300" b="1"/>
+            <a:lvl2pPr marL="192024" indent="0">
+              <a:buNone/>
+              <a:defRPr sz="840" b="1"/>
             </a:lvl2pPr>
-            <a:lvl3pPr marL="594360" indent="0">
-              <a:buNone/>
-              <a:defRPr sz="1170" b="1"/>
+            <a:lvl3pPr marL="384048" indent="0">
+              <a:buNone/>
+              <a:defRPr sz="756" b="1"/>
             </a:lvl3pPr>
-            <a:lvl4pPr marL="891540" indent="0">
-              <a:buNone/>
-              <a:defRPr sz="1040" b="1"/>
+            <a:lvl4pPr marL="576072" indent="0">
+              <a:buNone/>
+              <a:defRPr sz="672" b="1"/>
             </a:lvl4pPr>
-            <a:lvl5pPr marL="1188720" indent="0">
-              <a:buNone/>
-              <a:defRPr sz="1040" b="1"/>
+            <a:lvl5pPr marL="768096" indent="0">
+              <a:buNone/>
+              <a:defRPr sz="672" b="1"/>
             </a:lvl5pPr>
-            <a:lvl6pPr marL="1485900" indent="0">
-              <a:buNone/>
-              <a:defRPr sz="1040" b="1"/>
+            <a:lvl6pPr marL="960120" indent="0">
+              <a:buNone/>
+              <a:defRPr sz="672" b="1"/>
             </a:lvl6pPr>
-            <a:lvl7pPr marL="1783080" indent="0">
-              <a:buNone/>
-              <a:defRPr sz="1040" b="1"/>
+            <a:lvl7pPr marL="1152144" indent="0">
+              <a:buNone/>
+              <a:defRPr sz="672" b="1"/>
             </a:lvl7pPr>
-            <a:lvl8pPr marL="2080260" indent="0">
-              <a:buNone/>
-              <a:defRPr sz="1040" b="1"/>
+            <a:lvl8pPr marL="1344168" indent="0">
+              <a:buNone/>
+              <a:defRPr sz="672" b="1"/>
             </a:lvl8pPr>
-            <a:lvl9pPr marL="2377440" indent="0">
-              <a:buNone/>
-              <a:defRPr sz="1040" b="1"/>
+            <a:lvl9pPr marL="1536192" indent="0">
+              <a:buNone/>
+              <a:defRPr sz="672" b="1"/>
             </a:lvl9pPr>
           </a:lstStyle>
           <a:p>
@@ -1863,8 +1863,8 @@
         </p:nvSpPr>
         <p:spPr>
           <a:xfrm>
-            <a:off x="409397" y="2004060"/>
-            <a:ext cx="2514421" cy="2947670"/>
+            <a:off x="264512" y="2338070"/>
+            <a:ext cx="1624569" cy="3438949"/>
           </a:xfrm>
         </p:spPr>
         <p:txBody>
@@ -1920,8 +1920,8 @@
         </p:nvSpPr>
         <p:spPr>
           <a:xfrm>
-            <a:off x="3008948" y="1344930"/>
-            <a:ext cx="2526804" cy="659130"/>
+            <a:off x="1944083" y="1569085"/>
+            <a:ext cx="1632569" cy="768985"/>
           </a:xfrm>
         </p:spPr>
         <p:txBody>
@@ -1929,39 +1929,39 @@
           <a:lstStyle>
             <a:lvl1pPr marL="0" indent="0">
               <a:buNone/>
-              <a:defRPr sz="1560" b="1"/>
+              <a:defRPr sz="1008" b="1"/>
             </a:lvl1pPr>
-            <a:lvl2pPr marL="297180" indent="0">
-              <a:buNone/>
-              <a:defRPr sz="1300" b="1"/>
+            <a:lvl2pPr marL="192024" indent="0">
+              <a:buNone/>
+              <a:defRPr sz="840" b="1"/>
             </a:lvl2pPr>
-            <a:lvl3pPr marL="594360" indent="0">
-              <a:buNone/>
-              <a:defRPr sz="1170" b="1"/>
+            <a:lvl3pPr marL="384048" indent="0">
+              <a:buNone/>
+              <a:defRPr sz="756" b="1"/>
             </a:lvl3pPr>
-            <a:lvl4pPr marL="891540" indent="0">
-              <a:buNone/>
-              <a:defRPr sz="1040" b="1"/>
+            <a:lvl4pPr marL="576072" indent="0">
+              <a:buNone/>
+              <a:defRPr sz="672" b="1"/>
             </a:lvl4pPr>
-            <a:lvl5pPr marL="1188720" indent="0">
-              <a:buNone/>
-              <a:defRPr sz="1040" b="1"/>
+            <a:lvl5pPr marL="768096" indent="0">
+              <a:buNone/>
+              <a:defRPr sz="672" b="1"/>
             </a:lvl5pPr>
-            <a:lvl6pPr marL="1485900" indent="0">
-              <a:buNone/>
-              <a:defRPr sz="1040" b="1"/>
+            <a:lvl6pPr marL="960120" indent="0">
+              <a:buNone/>
+              <a:defRPr sz="672" b="1"/>
             </a:lvl6pPr>
-            <a:lvl7pPr marL="1783080" indent="0">
-              <a:buNone/>
-              <a:defRPr sz="1040" b="1"/>
+            <a:lvl7pPr marL="1152144" indent="0">
+              <a:buNone/>
+              <a:defRPr sz="672" b="1"/>
             </a:lvl7pPr>
-            <a:lvl8pPr marL="2080260" indent="0">
-              <a:buNone/>
-              <a:defRPr sz="1040" b="1"/>
+            <a:lvl8pPr marL="1344168" indent="0">
+              <a:buNone/>
+              <a:defRPr sz="672" b="1"/>
             </a:lvl8pPr>
-            <a:lvl9pPr marL="2377440" indent="0">
-              <a:buNone/>
-              <a:defRPr sz="1040" b="1"/>
+            <a:lvl9pPr marL="1536192" indent="0">
+              <a:buNone/>
+              <a:defRPr sz="672" b="1"/>
             </a:lvl9pPr>
           </a:lstStyle>
           <a:p>
@@ -1985,8 +1985,8 @@
         </p:nvSpPr>
         <p:spPr>
           <a:xfrm>
-            <a:off x="3008948" y="2004060"/>
-            <a:ext cx="2526804" cy="2947670"/>
+            <a:off x="1944083" y="2338070"/>
+            <a:ext cx="1632569" cy="3438949"/>
           </a:xfrm>
         </p:spPr>
         <p:txBody>
@@ -2047,7 +2047,7 @@
           <a:p>
             <a:fld id="{E053DD94-EF7D-4B46-90DA-1D86C84E35B6}" type="datetimeFigureOut">
               <a:rPr lang="en-US" smtClean="0"/>
-              <a:t>12/16/22</a:t>
+              <a:t>2/15/23</a:t>
             </a:fld>
             <a:endParaRPr lang="en-US"/>
           </a:p>
@@ -2098,7 +2098,7 @@
     </p:spTree>
     <p:extLst>
       <p:ext uri="{BB962C8B-B14F-4D97-AF65-F5344CB8AC3E}">
-        <p14:creationId xmlns:p14="http://schemas.microsoft.com/office/powerpoint/2010/main" val="2953204246"/>
+        <p14:creationId xmlns:p14="http://schemas.microsoft.com/office/powerpoint/2010/main" val="2017107839"/>
       </p:ext>
     </p:extLst>
   </p:cSld>
@@ -2165,7 +2165,7 @@
           <a:p>
             <a:fld id="{E053DD94-EF7D-4B46-90DA-1D86C84E35B6}" type="datetimeFigureOut">
               <a:rPr lang="en-US" smtClean="0"/>
-              <a:t>12/16/22</a:t>
+              <a:t>2/15/23</a:t>
             </a:fld>
             <a:endParaRPr lang="en-US"/>
           </a:p>
@@ -2216,7 +2216,7 @@
     </p:spTree>
     <p:extLst>
       <p:ext uri="{BB962C8B-B14F-4D97-AF65-F5344CB8AC3E}">
-        <p14:creationId xmlns:p14="http://schemas.microsoft.com/office/powerpoint/2010/main" val="4129125041"/>
+        <p14:creationId xmlns:p14="http://schemas.microsoft.com/office/powerpoint/2010/main" val="141236602"/>
       </p:ext>
     </p:extLst>
   </p:cSld>
@@ -2260,7 +2260,7 @@
           <a:p>
             <a:fld id="{E053DD94-EF7D-4B46-90DA-1D86C84E35B6}" type="datetimeFigureOut">
               <a:rPr lang="en-US" smtClean="0"/>
-              <a:t>12/16/22</a:t>
+              <a:t>2/15/23</a:t>
             </a:fld>
             <a:endParaRPr lang="en-US"/>
           </a:p>
@@ -2311,7 +2311,7 @@
     </p:spTree>
     <p:extLst>
       <p:ext uri="{BB962C8B-B14F-4D97-AF65-F5344CB8AC3E}">
-        <p14:creationId xmlns:p14="http://schemas.microsoft.com/office/powerpoint/2010/main" val="1321152447"/>
+        <p14:creationId xmlns:p14="http://schemas.microsoft.com/office/powerpoint/2010/main" val="602696619"/>
       </p:ext>
     </p:extLst>
   </p:cSld>
@@ -2350,15 +2350,15 @@
         </p:nvSpPr>
         <p:spPr>
           <a:xfrm>
-            <a:off x="409397" y="365760"/>
-            <a:ext cx="1916966" cy="1280160"/>
+            <a:off x="264511" y="426720"/>
+            <a:ext cx="1238553" cy="1493520"/>
           </a:xfrm>
         </p:spPr>
         <p:txBody>
           <a:bodyPr anchor="b"/>
           <a:lstStyle>
             <a:lvl1pPr>
-              <a:defRPr sz="2080"/>
+              <a:defRPr sz="1344"/>
             </a:lvl1pPr>
           </a:lstStyle>
           <a:p>
@@ -2382,39 +2382,39 @@
         </p:nvSpPr>
         <p:spPr>
           <a:xfrm>
-            <a:off x="2526804" y="789941"/>
-            <a:ext cx="3008948" cy="3898900"/>
+            <a:off x="1632569" y="921598"/>
+            <a:ext cx="1944083" cy="4548717"/>
           </a:xfrm>
         </p:spPr>
         <p:txBody>
           <a:bodyPr/>
           <a:lstStyle>
             <a:lvl1pPr>
-              <a:defRPr sz="2080"/>
+              <a:defRPr sz="1344"/>
             </a:lvl1pPr>
             <a:lvl2pPr>
-              <a:defRPr sz="1820"/>
+              <a:defRPr sz="1176"/>
             </a:lvl2pPr>
             <a:lvl3pPr>
-              <a:defRPr sz="1560"/>
+              <a:defRPr sz="1008"/>
             </a:lvl3pPr>
             <a:lvl4pPr>
-              <a:defRPr sz="1300"/>
+              <a:defRPr sz="840"/>
             </a:lvl4pPr>
             <a:lvl5pPr>
-              <a:defRPr sz="1300"/>
+              <a:defRPr sz="840"/>
             </a:lvl5pPr>
             <a:lvl6pPr>
-              <a:defRPr sz="1300"/>
+              <a:defRPr sz="840"/>
             </a:lvl6pPr>
             <a:lvl7pPr>
-              <a:defRPr sz="1300"/>
+              <a:defRPr sz="840"/>
             </a:lvl7pPr>
             <a:lvl8pPr>
-              <a:defRPr sz="1300"/>
+              <a:defRPr sz="840"/>
             </a:lvl8pPr>
             <a:lvl9pPr>
-              <a:defRPr sz="1300"/>
+              <a:defRPr sz="840"/>
             </a:lvl9pPr>
           </a:lstStyle>
           <a:p>
@@ -2467,8 +2467,8 @@
         </p:nvSpPr>
         <p:spPr>
           <a:xfrm>
-            <a:off x="409397" y="1645920"/>
-            <a:ext cx="1916966" cy="3049270"/>
+            <a:off x="264511" y="1920240"/>
+            <a:ext cx="1238553" cy="3557482"/>
           </a:xfrm>
         </p:spPr>
         <p:txBody>
@@ -2476,39 +2476,39 @@
           <a:lstStyle>
             <a:lvl1pPr marL="0" indent="0">
               <a:buNone/>
-              <a:defRPr sz="1040"/>
+              <a:defRPr sz="672"/>
             </a:lvl1pPr>
-            <a:lvl2pPr marL="297180" indent="0">
-              <a:buNone/>
-              <a:defRPr sz="910"/>
+            <a:lvl2pPr marL="192024" indent="0">
+              <a:buNone/>
+              <a:defRPr sz="588"/>
             </a:lvl2pPr>
-            <a:lvl3pPr marL="594360" indent="0">
-              <a:buNone/>
-              <a:defRPr sz="780"/>
+            <a:lvl3pPr marL="384048" indent="0">
+              <a:buNone/>
+              <a:defRPr sz="504"/>
             </a:lvl3pPr>
-            <a:lvl4pPr marL="891540" indent="0">
-              <a:buNone/>
-              <a:defRPr sz="650"/>
+            <a:lvl4pPr marL="576072" indent="0">
+              <a:buNone/>
+              <a:defRPr sz="420"/>
             </a:lvl4pPr>
-            <a:lvl5pPr marL="1188720" indent="0">
-              <a:buNone/>
-              <a:defRPr sz="650"/>
+            <a:lvl5pPr marL="768096" indent="0">
+              <a:buNone/>
+              <a:defRPr sz="420"/>
             </a:lvl5pPr>
-            <a:lvl6pPr marL="1485900" indent="0">
-              <a:buNone/>
-              <a:defRPr sz="650"/>
+            <a:lvl6pPr marL="960120" indent="0">
+              <a:buNone/>
+              <a:defRPr sz="420"/>
             </a:lvl6pPr>
-            <a:lvl7pPr marL="1783080" indent="0">
-              <a:buNone/>
-              <a:defRPr sz="650"/>
+            <a:lvl7pPr marL="1152144" indent="0">
+              <a:buNone/>
+              <a:defRPr sz="420"/>
             </a:lvl7pPr>
-            <a:lvl8pPr marL="2080260" indent="0">
-              <a:buNone/>
-              <a:defRPr sz="650"/>
+            <a:lvl8pPr marL="1344168" indent="0">
+              <a:buNone/>
+              <a:defRPr sz="420"/>
             </a:lvl8pPr>
-            <a:lvl9pPr marL="2377440" indent="0">
-              <a:buNone/>
-              <a:defRPr sz="650"/>
+            <a:lvl9pPr marL="1536192" indent="0">
+              <a:buNone/>
+              <a:defRPr sz="420"/>
             </a:lvl9pPr>
           </a:lstStyle>
           <a:p>
@@ -2537,7 +2537,7 @@
           <a:p>
             <a:fld id="{E053DD94-EF7D-4B46-90DA-1D86C84E35B6}" type="datetimeFigureOut">
               <a:rPr lang="en-US" smtClean="0"/>
-              <a:t>12/16/22</a:t>
+              <a:t>2/15/23</a:t>
             </a:fld>
             <a:endParaRPr lang="en-US"/>
           </a:p>
@@ -2588,7 +2588,7 @@
     </p:spTree>
     <p:extLst>
       <p:ext uri="{BB962C8B-B14F-4D97-AF65-F5344CB8AC3E}">
-        <p14:creationId xmlns:p14="http://schemas.microsoft.com/office/powerpoint/2010/main" val="781105904"/>
+        <p14:creationId xmlns:p14="http://schemas.microsoft.com/office/powerpoint/2010/main" val="2669107306"/>
       </p:ext>
     </p:extLst>
   </p:cSld>
@@ -2627,15 +2627,15 @@
         </p:nvSpPr>
         <p:spPr>
           <a:xfrm>
-            <a:off x="409397" y="365760"/>
-            <a:ext cx="1916966" cy="1280160"/>
+            <a:off x="264511" y="426720"/>
+            <a:ext cx="1238553" cy="1493520"/>
           </a:xfrm>
         </p:spPr>
         <p:txBody>
           <a:bodyPr anchor="b"/>
           <a:lstStyle>
             <a:lvl1pPr>
-              <a:defRPr sz="2080"/>
+              <a:defRPr sz="1344"/>
             </a:lvl1pPr>
           </a:lstStyle>
           <a:p>
@@ -2659,8 +2659,8 @@
         </p:nvSpPr>
         <p:spPr>
           <a:xfrm>
-            <a:off x="2526804" y="789941"/>
-            <a:ext cx="3008948" cy="3898900"/>
+            <a:off x="1632569" y="921598"/>
+            <a:ext cx="1944083" cy="4548717"/>
           </a:xfrm>
         </p:spPr>
         <p:txBody>
@@ -2668,39 +2668,39 @@
           <a:lstStyle>
             <a:lvl1pPr marL="0" indent="0">
               <a:buNone/>
-              <a:defRPr sz="2080"/>
+              <a:defRPr sz="1344"/>
             </a:lvl1pPr>
-            <a:lvl2pPr marL="297180" indent="0">
-              <a:buNone/>
-              <a:defRPr sz="1820"/>
+            <a:lvl2pPr marL="192024" indent="0">
+              <a:buNone/>
+              <a:defRPr sz="1176"/>
             </a:lvl2pPr>
-            <a:lvl3pPr marL="594360" indent="0">
-              <a:buNone/>
-              <a:defRPr sz="1560"/>
+            <a:lvl3pPr marL="384048" indent="0">
+              <a:buNone/>
+              <a:defRPr sz="1008"/>
             </a:lvl3pPr>
-            <a:lvl4pPr marL="891540" indent="0">
-              <a:buNone/>
-              <a:defRPr sz="1300"/>
+            <a:lvl4pPr marL="576072" indent="0">
+              <a:buNone/>
+              <a:defRPr sz="840"/>
             </a:lvl4pPr>
-            <a:lvl5pPr marL="1188720" indent="0">
-              <a:buNone/>
-              <a:defRPr sz="1300"/>
+            <a:lvl5pPr marL="768096" indent="0">
+              <a:buNone/>
+              <a:defRPr sz="840"/>
             </a:lvl5pPr>
-            <a:lvl6pPr marL="1485900" indent="0">
-              <a:buNone/>
-              <a:defRPr sz="1300"/>
+            <a:lvl6pPr marL="960120" indent="0">
+              <a:buNone/>
+              <a:defRPr sz="840"/>
             </a:lvl6pPr>
-            <a:lvl7pPr marL="1783080" indent="0">
-              <a:buNone/>
-              <a:defRPr sz="1300"/>
+            <a:lvl7pPr marL="1152144" indent="0">
+              <a:buNone/>
+              <a:defRPr sz="840"/>
             </a:lvl7pPr>
-            <a:lvl8pPr marL="2080260" indent="0">
-              <a:buNone/>
-              <a:defRPr sz="1300"/>
+            <a:lvl8pPr marL="1344168" indent="0">
+              <a:buNone/>
+              <a:defRPr sz="840"/>
             </a:lvl8pPr>
-            <a:lvl9pPr marL="2377440" indent="0">
-              <a:buNone/>
-              <a:defRPr sz="1300"/>
+            <a:lvl9pPr marL="1536192" indent="0">
+              <a:buNone/>
+              <a:defRPr sz="840"/>
             </a:lvl9pPr>
           </a:lstStyle>
           <a:p>
@@ -2724,8 +2724,8 @@
         </p:nvSpPr>
         <p:spPr>
           <a:xfrm>
-            <a:off x="409397" y="1645920"/>
-            <a:ext cx="1916966" cy="3049270"/>
+            <a:off x="264511" y="1920240"/>
+            <a:ext cx="1238553" cy="3557482"/>
           </a:xfrm>
         </p:spPr>
         <p:txBody>
@@ -2733,39 +2733,39 @@
           <a:lstStyle>
             <a:lvl1pPr marL="0" indent="0">
               <a:buNone/>
-              <a:defRPr sz="1040"/>
+              <a:defRPr sz="672"/>
             </a:lvl1pPr>
-            <a:lvl2pPr marL="297180" indent="0">
-              <a:buNone/>
-              <a:defRPr sz="910"/>
+            <a:lvl2pPr marL="192024" indent="0">
+              <a:buNone/>
+              <a:defRPr sz="588"/>
             </a:lvl2pPr>
-            <a:lvl3pPr marL="594360" indent="0">
-              <a:buNone/>
-              <a:defRPr sz="780"/>
+            <a:lvl3pPr marL="384048" indent="0">
+              <a:buNone/>
+              <a:defRPr sz="504"/>
             </a:lvl3pPr>
-            <a:lvl4pPr marL="891540" indent="0">
-              <a:buNone/>
-              <a:defRPr sz="650"/>
+            <a:lvl4pPr marL="576072" indent="0">
+              <a:buNone/>
+              <a:defRPr sz="420"/>
             </a:lvl4pPr>
-            <a:lvl5pPr marL="1188720" indent="0">
-              <a:buNone/>
-              <a:defRPr sz="650"/>
+            <a:lvl5pPr marL="768096" indent="0">
+              <a:buNone/>
+              <a:defRPr sz="420"/>
             </a:lvl5pPr>
-            <a:lvl6pPr marL="1485900" indent="0">
-              <a:buNone/>
-              <a:defRPr sz="650"/>
+            <a:lvl6pPr marL="960120" indent="0">
+              <a:buNone/>
+              <a:defRPr sz="420"/>
             </a:lvl6pPr>
-            <a:lvl7pPr marL="1783080" indent="0">
-              <a:buNone/>
-              <a:defRPr sz="650"/>
+            <a:lvl7pPr marL="1152144" indent="0">
+              <a:buNone/>
+              <a:defRPr sz="420"/>
             </a:lvl7pPr>
-            <a:lvl8pPr marL="2080260" indent="0">
-              <a:buNone/>
-              <a:defRPr sz="650"/>
+            <a:lvl8pPr marL="1344168" indent="0">
+              <a:buNone/>
+              <a:defRPr sz="420"/>
             </a:lvl8pPr>
-            <a:lvl9pPr marL="2377440" indent="0">
-              <a:buNone/>
-              <a:defRPr sz="650"/>
+            <a:lvl9pPr marL="1536192" indent="0">
+              <a:buNone/>
+              <a:defRPr sz="420"/>
             </a:lvl9pPr>
           </a:lstStyle>
           <a:p>
@@ -2794,7 +2794,7 @@
           <a:p>
             <a:fld id="{E053DD94-EF7D-4B46-90DA-1D86C84E35B6}" type="datetimeFigureOut">
               <a:rPr lang="en-US" smtClean="0"/>
-              <a:t>12/16/22</a:t>
+              <a:t>2/15/23</a:t>
             </a:fld>
             <a:endParaRPr lang="en-US"/>
           </a:p>
@@ -2845,7 +2845,7 @@
     </p:spTree>
     <p:extLst>
       <p:ext uri="{BB962C8B-B14F-4D97-AF65-F5344CB8AC3E}">
-        <p14:creationId xmlns:p14="http://schemas.microsoft.com/office/powerpoint/2010/main" val="4026947701"/>
+        <p14:creationId xmlns:p14="http://schemas.microsoft.com/office/powerpoint/2010/main" val="2345303529"/>
       </p:ext>
     </p:extLst>
   </p:cSld>
@@ -2889,8 +2889,8 @@
         </p:nvSpPr>
         <p:spPr>
           <a:xfrm>
-            <a:off x="408623" y="292101"/>
-            <a:ext cx="5126355" cy="1060450"/>
+            <a:off x="264011" y="340785"/>
+            <a:ext cx="3312141" cy="1237192"/>
           </a:xfrm>
           <a:prstGeom prst="rect">
             <a:avLst/>
@@ -2922,8 +2922,8 @@
         </p:nvSpPr>
         <p:spPr>
           <a:xfrm>
-            <a:off x="408623" y="1460500"/>
-            <a:ext cx="5126355" cy="3481070"/>
+            <a:off x="264011" y="1703917"/>
+            <a:ext cx="3312141" cy="4061249"/>
           </a:xfrm>
           <a:prstGeom prst="rect">
             <a:avLst/>
@@ -2984,8 +2984,8 @@
         </p:nvSpPr>
         <p:spPr>
           <a:xfrm>
-            <a:off x="408623" y="5085081"/>
-            <a:ext cx="1337310" cy="292100"/>
+            <a:off x="264011" y="5932595"/>
+            <a:ext cx="864037" cy="340783"/>
           </a:xfrm>
           <a:prstGeom prst="rect">
             <a:avLst/>
@@ -2995,7 +2995,7 @@
           <a:bodyPr vert="horz" lIns="91440" tIns="45720" rIns="91440" bIns="45720" rtlCol="0" anchor="ctr"/>
           <a:lstStyle>
             <a:lvl1pPr algn="l">
-              <a:defRPr sz="780">
+              <a:defRPr sz="504">
                 <a:solidFill>
                   <a:schemeClr val="tx1">
                     <a:tint val="75000"/>
@@ -3007,7 +3007,7 @@
           <a:p>
             <a:fld id="{E053DD94-EF7D-4B46-90DA-1D86C84E35B6}" type="datetimeFigureOut">
               <a:rPr lang="en-US" smtClean="0"/>
-              <a:t>12/16/22</a:t>
+              <a:t>2/15/23</a:t>
             </a:fld>
             <a:endParaRPr lang="en-US"/>
           </a:p>
@@ -3025,8 +3025,8 @@
         </p:nvSpPr>
         <p:spPr>
           <a:xfrm>
-            <a:off x="1968818" y="5085081"/>
-            <a:ext cx="2005965" cy="292100"/>
+            <a:off x="1272054" y="5932595"/>
+            <a:ext cx="1296055" cy="340783"/>
           </a:xfrm>
           <a:prstGeom prst="rect">
             <a:avLst/>
@@ -3036,7 +3036,7 @@
           <a:bodyPr vert="horz" lIns="91440" tIns="45720" rIns="91440" bIns="45720" rtlCol="0" anchor="ctr"/>
           <a:lstStyle>
             <a:lvl1pPr algn="ctr">
-              <a:defRPr sz="780">
+              <a:defRPr sz="504">
                 <a:solidFill>
                   <a:schemeClr val="tx1">
                     <a:tint val="75000"/>
@@ -3062,8 +3062,8 @@
         </p:nvSpPr>
         <p:spPr>
           <a:xfrm>
-            <a:off x="4197668" y="5085081"/>
-            <a:ext cx="1337310" cy="292100"/>
+            <a:off x="2712115" y="5932595"/>
+            <a:ext cx="864037" cy="340783"/>
           </a:xfrm>
           <a:prstGeom prst="rect">
             <a:avLst/>
@@ -3073,7 +3073,7 @@
           <a:bodyPr vert="horz" lIns="91440" tIns="45720" rIns="91440" bIns="45720" rtlCol="0" anchor="ctr"/>
           <a:lstStyle>
             <a:lvl1pPr algn="r">
-              <a:defRPr sz="780">
+              <a:defRPr sz="504">
                 <a:solidFill>
                   <a:schemeClr val="tx1">
                     <a:tint val="75000"/>
@@ -3094,27 +3094,27 @@
     </p:spTree>
     <p:extLst>
       <p:ext uri="{BB962C8B-B14F-4D97-AF65-F5344CB8AC3E}">
-        <p14:creationId xmlns:p14="http://schemas.microsoft.com/office/powerpoint/2010/main" val="1601946465"/>
+        <p14:creationId xmlns:p14="http://schemas.microsoft.com/office/powerpoint/2010/main" val="3370952161"/>
       </p:ext>
     </p:extLst>
   </p:cSld>
   <p:clrMap bg1="lt1" tx1="dk1" bg2="lt2" tx2="dk2" accent1="accent1" accent2="accent2" accent3="accent3" accent4="accent4" accent5="accent5" accent6="accent6" hlink="hlink" folHlink="folHlink"/>
   <p:sldLayoutIdLst>
-    <p:sldLayoutId id="2147483817" r:id="rId1"/>
-    <p:sldLayoutId id="2147483818" r:id="rId2"/>
-    <p:sldLayoutId id="2147483819" r:id="rId3"/>
-    <p:sldLayoutId id="2147483820" r:id="rId4"/>
-    <p:sldLayoutId id="2147483821" r:id="rId5"/>
-    <p:sldLayoutId id="2147483822" r:id="rId6"/>
-    <p:sldLayoutId id="2147483823" r:id="rId7"/>
-    <p:sldLayoutId id="2147483824" r:id="rId8"/>
-    <p:sldLayoutId id="2147483825" r:id="rId9"/>
-    <p:sldLayoutId id="2147483826" r:id="rId10"/>
-    <p:sldLayoutId id="2147483827" r:id="rId11"/>
+    <p:sldLayoutId id="2147483865" r:id="rId1"/>
+    <p:sldLayoutId id="2147483866" r:id="rId2"/>
+    <p:sldLayoutId id="2147483867" r:id="rId3"/>
+    <p:sldLayoutId id="2147483868" r:id="rId4"/>
+    <p:sldLayoutId id="2147483869" r:id="rId5"/>
+    <p:sldLayoutId id="2147483870" r:id="rId6"/>
+    <p:sldLayoutId id="2147483871" r:id="rId7"/>
+    <p:sldLayoutId id="2147483872" r:id="rId8"/>
+    <p:sldLayoutId id="2147483873" r:id="rId9"/>
+    <p:sldLayoutId id="2147483874" r:id="rId10"/>
+    <p:sldLayoutId id="2147483875" r:id="rId11"/>
   </p:sldLayoutIdLst>
   <p:txStyles>
     <p:titleStyle>
-      <a:lvl1pPr algn="l" defTabSz="594360" rtl="0" eaLnBrk="1" latinLnBrk="0" hangingPunct="1">
+      <a:lvl1pPr algn="l" defTabSz="384048" rtl="0" eaLnBrk="1" latinLnBrk="0" hangingPunct="1">
         <a:lnSpc>
           <a:spcPct val="90000"/>
         </a:lnSpc>
@@ -3122,7 +3122,7 @@
           <a:spcPct val="0"/>
         </a:spcBef>
         <a:buNone/>
-        <a:defRPr sz="2860" kern="1200">
+        <a:defRPr sz="1848" kern="1200">
           <a:solidFill>
             <a:schemeClr val="tx1"/>
           </a:solidFill>
@@ -3133,16 +3133,16 @@
       </a:lvl1pPr>
     </p:titleStyle>
     <p:bodyStyle>
-      <a:lvl1pPr marL="148590" indent="-148590" algn="l" defTabSz="594360" rtl="0" eaLnBrk="1" latinLnBrk="0" hangingPunct="1">
+      <a:lvl1pPr marL="96012" indent="-96012" algn="l" defTabSz="384048" rtl="0" eaLnBrk="1" latinLnBrk="0" hangingPunct="1">
         <a:lnSpc>
           <a:spcPct val="90000"/>
         </a:lnSpc>
         <a:spcBef>
-          <a:spcPts val="650"/>
+          <a:spcPts val="420"/>
         </a:spcBef>
         <a:buFont typeface="Arial" panose="020B0604020202020204" pitchFamily="34" charset="0"/>
         <a:buChar char="•"/>
-        <a:defRPr sz="1820" kern="1200">
+        <a:defRPr sz="1176" kern="1200">
           <a:solidFill>
             <a:schemeClr val="tx1"/>
           </a:solidFill>
@@ -3151,16 +3151,16 @@
           <a:cs typeface="+mn-cs"/>
         </a:defRPr>
       </a:lvl1pPr>
-      <a:lvl2pPr marL="445770" indent="-148590" algn="l" defTabSz="594360" rtl="0" eaLnBrk="1" latinLnBrk="0" hangingPunct="1">
+      <a:lvl2pPr marL="288036" indent="-96012" algn="l" defTabSz="384048" rtl="0" eaLnBrk="1" latinLnBrk="0" hangingPunct="1">
         <a:lnSpc>
           <a:spcPct val="90000"/>
         </a:lnSpc>
         <a:spcBef>
-          <a:spcPts val="325"/>
+          <a:spcPts val="210"/>
         </a:spcBef>
         <a:buFont typeface="Arial" panose="020B0604020202020204" pitchFamily="34" charset="0"/>
         <a:buChar char="•"/>
-        <a:defRPr sz="1560" kern="1200">
+        <a:defRPr sz="1008" kern="1200">
           <a:solidFill>
             <a:schemeClr val="tx1"/>
           </a:solidFill>
@@ -3169,16 +3169,16 @@
           <a:cs typeface="+mn-cs"/>
         </a:defRPr>
       </a:lvl2pPr>
-      <a:lvl3pPr marL="742950" indent="-148590" algn="l" defTabSz="594360" rtl="0" eaLnBrk="1" latinLnBrk="0" hangingPunct="1">
+      <a:lvl3pPr marL="480060" indent="-96012" algn="l" defTabSz="384048" rtl="0" eaLnBrk="1" latinLnBrk="0" hangingPunct="1">
         <a:lnSpc>
           <a:spcPct val="90000"/>
         </a:lnSpc>
         <a:spcBef>
-          <a:spcPts val="325"/>
+          <a:spcPts val="210"/>
         </a:spcBef>
         <a:buFont typeface="Arial" panose="020B0604020202020204" pitchFamily="34" charset="0"/>
         <a:buChar char="•"/>
-        <a:defRPr sz="1300" kern="1200">
+        <a:defRPr sz="840" kern="1200">
           <a:solidFill>
             <a:schemeClr val="tx1"/>
           </a:solidFill>
@@ -3187,16 +3187,16 @@
           <a:cs typeface="+mn-cs"/>
         </a:defRPr>
       </a:lvl3pPr>
-      <a:lvl4pPr marL="1040130" indent="-148590" algn="l" defTabSz="594360" rtl="0" eaLnBrk="1" latinLnBrk="0" hangingPunct="1">
+      <a:lvl4pPr marL="672084" indent="-96012" algn="l" defTabSz="384048" rtl="0" eaLnBrk="1" latinLnBrk="0" hangingPunct="1">
         <a:lnSpc>
           <a:spcPct val="90000"/>
         </a:lnSpc>
         <a:spcBef>
-          <a:spcPts val="325"/>
+          <a:spcPts val="210"/>
         </a:spcBef>
         <a:buFont typeface="Arial" panose="020B0604020202020204" pitchFamily="34" charset="0"/>
         <a:buChar char="•"/>
-        <a:defRPr sz="1170" kern="1200">
+        <a:defRPr sz="756" kern="1200">
           <a:solidFill>
             <a:schemeClr val="tx1"/>
           </a:solidFill>
@@ -3205,16 +3205,16 @@
           <a:cs typeface="+mn-cs"/>
         </a:defRPr>
       </a:lvl4pPr>
-      <a:lvl5pPr marL="1337310" indent="-148590" algn="l" defTabSz="594360" rtl="0" eaLnBrk="1" latinLnBrk="0" hangingPunct="1">
+      <a:lvl5pPr marL="864108" indent="-96012" algn="l" defTabSz="384048" rtl="0" eaLnBrk="1" latinLnBrk="0" hangingPunct="1">
         <a:lnSpc>
           <a:spcPct val="90000"/>
         </a:lnSpc>
         <a:spcBef>
-          <a:spcPts val="325"/>
+          <a:spcPts val="210"/>
         </a:spcBef>
         <a:buFont typeface="Arial" panose="020B0604020202020204" pitchFamily="34" charset="0"/>
         <a:buChar char="•"/>
-        <a:defRPr sz="1170" kern="1200">
+        <a:defRPr sz="756" kern="1200">
           <a:solidFill>
             <a:schemeClr val="tx1"/>
           </a:solidFill>
@@ -3223,16 +3223,16 @@
           <a:cs typeface="+mn-cs"/>
         </a:defRPr>
       </a:lvl5pPr>
-      <a:lvl6pPr marL="1634490" indent="-148590" algn="l" defTabSz="594360" rtl="0" eaLnBrk="1" latinLnBrk="0" hangingPunct="1">
+      <a:lvl6pPr marL="1056132" indent="-96012" algn="l" defTabSz="384048" rtl="0" eaLnBrk="1" latinLnBrk="0" hangingPunct="1">
         <a:lnSpc>
           <a:spcPct val="90000"/>
         </a:lnSpc>
         <a:spcBef>
-          <a:spcPts val="325"/>
+          <a:spcPts val="210"/>
         </a:spcBef>
         <a:buFont typeface="Arial" panose="020B0604020202020204" pitchFamily="34" charset="0"/>
         <a:buChar char="•"/>
-        <a:defRPr sz="1170" kern="1200">
+        <a:defRPr sz="756" kern="1200">
           <a:solidFill>
             <a:schemeClr val="tx1"/>
           </a:solidFill>
@@ -3241,16 +3241,16 @@
           <a:cs typeface="+mn-cs"/>
         </a:defRPr>
       </a:lvl6pPr>
-      <a:lvl7pPr marL="1931670" indent="-148590" algn="l" defTabSz="594360" rtl="0" eaLnBrk="1" latinLnBrk="0" hangingPunct="1">
+      <a:lvl7pPr marL="1248156" indent="-96012" algn="l" defTabSz="384048" rtl="0" eaLnBrk="1" latinLnBrk="0" hangingPunct="1">
         <a:lnSpc>
           <a:spcPct val="90000"/>
         </a:lnSpc>
         <a:spcBef>
-          <a:spcPts val="325"/>
+          <a:spcPts val="210"/>
         </a:spcBef>
         <a:buFont typeface="Arial" panose="020B0604020202020204" pitchFamily="34" charset="0"/>
         <a:buChar char="•"/>
-        <a:defRPr sz="1170" kern="1200">
+        <a:defRPr sz="756" kern="1200">
           <a:solidFill>
             <a:schemeClr val="tx1"/>
           </a:solidFill>
@@ -3259,16 +3259,16 @@
           <a:cs typeface="+mn-cs"/>
         </a:defRPr>
       </a:lvl7pPr>
-      <a:lvl8pPr marL="2228850" indent="-148590" algn="l" defTabSz="594360" rtl="0" eaLnBrk="1" latinLnBrk="0" hangingPunct="1">
+      <a:lvl8pPr marL="1440180" indent="-96012" algn="l" defTabSz="384048" rtl="0" eaLnBrk="1" latinLnBrk="0" hangingPunct="1">
         <a:lnSpc>
           <a:spcPct val="90000"/>
         </a:lnSpc>
         <a:spcBef>
-          <a:spcPts val="325"/>
+          <a:spcPts val="210"/>
         </a:spcBef>
         <a:buFont typeface="Arial" panose="020B0604020202020204" pitchFamily="34" charset="0"/>
         <a:buChar char="•"/>
-        <a:defRPr sz="1170" kern="1200">
+        <a:defRPr sz="756" kern="1200">
           <a:solidFill>
             <a:schemeClr val="tx1"/>
           </a:solidFill>
@@ -3277,16 +3277,16 @@
           <a:cs typeface="+mn-cs"/>
         </a:defRPr>
       </a:lvl8pPr>
-      <a:lvl9pPr marL="2526030" indent="-148590" algn="l" defTabSz="594360" rtl="0" eaLnBrk="1" latinLnBrk="0" hangingPunct="1">
+      <a:lvl9pPr marL="1632204" indent="-96012" algn="l" defTabSz="384048" rtl="0" eaLnBrk="1" latinLnBrk="0" hangingPunct="1">
         <a:lnSpc>
           <a:spcPct val="90000"/>
         </a:lnSpc>
         <a:spcBef>
-          <a:spcPts val="325"/>
+          <a:spcPts val="210"/>
         </a:spcBef>
         <a:buFont typeface="Arial" panose="020B0604020202020204" pitchFamily="34" charset="0"/>
         <a:buChar char="•"/>
-        <a:defRPr sz="1170" kern="1200">
+        <a:defRPr sz="756" kern="1200">
           <a:solidFill>
             <a:schemeClr val="tx1"/>
           </a:solidFill>
@@ -3300,8 +3300,8 @@
       <a:defPPr>
         <a:defRPr lang="en-US"/>
       </a:defPPr>
-      <a:lvl1pPr marL="0" algn="l" defTabSz="594360" rtl="0" eaLnBrk="1" latinLnBrk="0" hangingPunct="1">
-        <a:defRPr sz="1170" kern="1200">
+      <a:lvl1pPr marL="0" algn="l" defTabSz="384048" rtl="0" eaLnBrk="1" latinLnBrk="0" hangingPunct="1">
+        <a:defRPr sz="756" kern="1200">
           <a:solidFill>
             <a:schemeClr val="tx1"/>
           </a:solidFill>
@@ -3310,8 +3310,8 @@
           <a:cs typeface="+mn-cs"/>
         </a:defRPr>
       </a:lvl1pPr>
-      <a:lvl2pPr marL="297180" algn="l" defTabSz="594360" rtl="0" eaLnBrk="1" latinLnBrk="0" hangingPunct="1">
-        <a:defRPr sz="1170" kern="1200">
+      <a:lvl2pPr marL="192024" algn="l" defTabSz="384048" rtl="0" eaLnBrk="1" latinLnBrk="0" hangingPunct="1">
+        <a:defRPr sz="756" kern="1200">
           <a:solidFill>
             <a:schemeClr val="tx1"/>
           </a:solidFill>
@@ -3320,8 +3320,8 @@
           <a:cs typeface="+mn-cs"/>
         </a:defRPr>
       </a:lvl2pPr>
-      <a:lvl3pPr marL="594360" algn="l" defTabSz="594360" rtl="0" eaLnBrk="1" latinLnBrk="0" hangingPunct="1">
-        <a:defRPr sz="1170" kern="1200">
+      <a:lvl3pPr marL="384048" algn="l" defTabSz="384048" rtl="0" eaLnBrk="1" latinLnBrk="0" hangingPunct="1">
+        <a:defRPr sz="756" kern="1200">
           <a:solidFill>
             <a:schemeClr val="tx1"/>
           </a:solidFill>
@@ -3330,8 +3330,8 @@
           <a:cs typeface="+mn-cs"/>
         </a:defRPr>
       </a:lvl3pPr>
-      <a:lvl4pPr marL="891540" algn="l" defTabSz="594360" rtl="0" eaLnBrk="1" latinLnBrk="0" hangingPunct="1">
-        <a:defRPr sz="1170" kern="1200">
+      <a:lvl4pPr marL="576072" algn="l" defTabSz="384048" rtl="0" eaLnBrk="1" latinLnBrk="0" hangingPunct="1">
+        <a:defRPr sz="756" kern="1200">
           <a:solidFill>
             <a:schemeClr val="tx1"/>
           </a:solidFill>
@@ -3340,8 +3340,8 @@
           <a:cs typeface="+mn-cs"/>
         </a:defRPr>
       </a:lvl4pPr>
-      <a:lvl5pPr marL="1188720" algn="l" defTabSz="594360" rtl="0" eaLnBrk="1" latinLnBrk="0" hangingPunct="1">
-        <a:defRPr sz="1170" kern="1200">
+      <a:lvl5pPr marL="768096" algn="l" defTabSz="384048" rtl="0" eaLnBrk="1" latinLnBrk="0" hangingPunct="1">
+        <a:defRPr sz="756" kern="1200">
           <a:solidFill>
             <a:schemeClr val="tx1"/>
           </a:solidFill>
@@ -3350,8 +3350,8 @@
           <a:cs typeface="+mn-cs"/>
         </a:defRPr>
       </a:lvl5pPr>
-      <a:lvl6pPr marL="1485900" algn="l" defTabSz="594360" rtl="0" eaLnBrk="1" latinLnBrk="0" hangingPunct="1">
-        <a:defRPr sz="1170" kern="1200">
+      <a:lvl6pPr marL="960120" algn="l" defTabSz="384048" rtl="0" eaLnBrk="1" latinLnBrk="0" hangingPunct="1">
+        <a:defRPr sz="756" kern="1200">
           <a:solidFill>
             <a:schemeClr val="tx1"/>
           </a:solidFill>
@@ -3360,8 +3360,8 @@
           <a:cs typeface="+mn-cs"/>
         </a:defRPr>
       </a:lvl6pPr>
-      <a:lvl7pPr marL="1783080" algn="l" defTabSz="594360" rtl="0" eaLnBrk="1" latinLnBrk="0" hangingPunct="1">
-        <a:defRPr sz="1170" kern="1200">
+      <a:lvl7pPr marL="1152144" algn="l" defTabSz="384048" rtl="0" eaLnBrk="1" latinLnBrk="0" hangingPunct="1">
+        <a:defRPr sz="756" kern="1200">
           <a:solidFill>
             <a:schemeClr val="tx1"/>
           </a:solidFill>
@@ -3370,8 +3370,8 @@
           <a:cs typeface="+mn-cs"/>
         </a:defRPr>
       </a:lvl7pPr>
-      <a:lvl8pPr marL="2080260" algn="l" defTabSz="594360" rtl="0" eaLnBrk="1" latinLnBrk="0" hangingPunct="1">
-        <a:defRPr sz="1170" kern="1200">
+      <a:lvl8pPr marL="1344168" algn="l" defTabSz="384048" rtl="0" eaLnBrk="1" latinLnBrk="0" hangingPunct="1">
+        <a:defRPr sz="756" kern="1200">
           <a:solidFill>
             <a:schemeClr val="tx1"/>
           </a:solidFill>
@@ -3380,8 +3380,8 @@
           <a:cs typeface="+mn-cs"/>
         </a:defRPr>
       </a:lvl8pPr>
-      <a:lvl9pPr marL="2377440" algn="l" defTabSz="594360" rtl="0" eaLnBrk="1" latinLnBrk="0" hangingPunct="1">
-        <a:defRPr sz="1170" kern="1200">
+      <a:lvl9pPr marL="1536192" algn="l" defTabSz="384048" rtl="0" eaLnBrk="1" latinLnBrk="0" hangingPunct="1">
+        <a:defRPr sz="756" kern="1200">
           <a:solidFill>
             <a:schemeClr val="tx1"/>
           </a:solidFill>
@@ -3414,10 +3414,10 @@
       </p:grpSpPr>
       <p:pic>
         <p:nvPicPr>
-          <p:cNvPr id="3" name="Picture 2" descr="Chart&#10;&#10;Description automatically generated">
+          <p:cNvPr id="2" name="Picture 1">
             <a:extLst>
               <a:ext uri="{FF2B5EF4-FFF2-40B4-BE49-F238E27FC236}">
-                <a16:creationId xmlns:a16="http://schemas.microsoft.com/office/drawing/2014/main" id="{C92BA83D-A8BA-68E3-65D5-41495828E079}"/>
+                <a16:creationId xmlns:a16="http://schemas.microsoft.com/office/drawing/2014/main" id="{6F1E109D-FA91-B905-14D9-3BB5ED65C7F0}"/>
               </a:ext>
             </a:extLst>
           </p:cNvPr>
@@ -3428,14 +3428,13 @@
         </p:nvPicPr>
         <p:blipFill>
           <a:blip r:embed="rId3"/>
-          <a:stretch>
-            <a:fillRect/>
-          </a:stretch>
+          <a:srcRect/>
+          <a:stretch/>
         </p:blipFill>
         <p:spPr>
           <a:xfrm>
-            <a:off x="457200" y="202557"/>
-            <a:ext cx="5486400" cy="1371600"/>
+            <a:off x="98575" y="78621"/>
+            <a:ext cx="3657600" cy="2011680"/>
           </a:xfrm>
           <a:prstGeom prst="rect">
             <a:avLst/>
@@ -3444,10 +3443,10 @@
       </p:pic>
       <p:pic>
         <p:nvPicPr>
-          <p:cNvPr id="8" name="Picture 7" descr="Chart&#10;&#10;Description automatically generated with medium confidence">
+          <p:cNvPr id="3" name="Picture 2">
             <a:extLst>
               <a:ext uri="{FF2B5EF4-FFF2-40B4-BE49-F238E27FC236}">
-                <a16:creationId xmlns:a16="http://schemas.microsoft.com/office/drawing/2014/main" id="{C735BF31-33FF-F03F-6C94-1D5BDF13C452}"/>
+                <a16:creationId xmlns:a16="http://schemas.microsoft.com/office/drawing/2014/main" id="{9B30572B-C29E-E937-BDF3-6C5F8E8792BF}"/>
               </a:ext>
             </a:extLst>
           </p:cNvPr>
@@ -3458,14 +3457,13 @@
         </p:nvPicPr>
         <p:blipFill>
           <a:blip r:embed="rId4"/>
-          <a:stretch>
-            <a:fillRect/>
-          </a:stretch>
+          <a:srcRect/>
+          <a:stretch/>
         </p:blipFill>
         <p:spPr>
           <a:xfrm>
-            <a:off x="457200" y="1390007"/>
-            <a:ext cx="5486400" cy="1371600"/>
+            <a:off x="98161" y="2060104"/>
+            <a:ext cx="3657600" cy="2194560"/>
           </a:xfrm>
           <a:prstGeom prst="rect">
             <a:avLst/>
@@ -3474,10 +3472,10 @@
       </p:pic>
       <p:pic>
         <p:nvPicPr>
-          <p:cNvPr id="10" name="Picture 9" descr="Chart&#10;&#10;Description automatically generated">
+          <p:cNvPr id="4" name="Picture 3">
             <a:extLst>
               <a:ext uri="{FF2B5EF4-FFF2-40B4-BE49-F238E27FC236}">
-                <a16:creationId xmlns:a16="http://schemas.microsoft.com/office/drawing/2014/main" id="{FF3C300B-7574-880D-C390-549A935B6941}"/>
+                <a16:creationId xmlns:a16="http://schemas.microsoft.com/office/drawing/2014/main" id="{B8B41F65-0C12-39D1-4BD5-3FC61192F458}"/>
               </a:ext>
             </a:extLst>
           </p:cNvPr>
@@ -3488,56 +3486,25 @@
         </p:nvPicPr>
         <p:blipFill>
           <a:blip r:embed="rId5"/>
-          <a:stretch>
-            <a:fillRect/>
-          </a:stretch>
+          <a:srcRect t="3429" b="3429"/>
+          <a:stretch/>
         </p:blipFill>
         <p:spPr>
           <a:xfrm>
-            <a:off x="457200" y="2602857"/>
-            <a:ext cx="5486400" cy="1371600"/>
+            <a:off x="98802" y="4357874"/>
+            <a:ext cx="3656769" cy="2043589"/>
           </a:xfrm>
           <a:prstGeom prst="rect">
             <a:avLst/>
           </a:prstGeom>
         </p:spPr>
       </p:pic>
-      <p:pic>
-        <p:nvPicPr>
-          <p:cNvPr id="14" name="Picture 13" descr="Chart, bar chart&#10;&#10;Description automatically generated">
+      <p:sp>
+        <p:nvSpPr>
+          <p:cNvPr id="5" name="TextBox 4">
             <a:extLst>
               <a:ext uri="{FF2B5EF4-FFF2-40B4-BE49-F238E27FC236}">
-                <a16:creationId xmlns:a16="http://schemas.microsoft.com/office/drawing/2014/main" id="{866F1702-6725-DD23-71C8-848510417521}"/>
-              </a:ext>
-            </a:extLst>
-          </p:cNvPr>
-          <p:cNvPicPr>
-            <a:picLocks noChangeAspect="1"/>
-          </p:cNvPicPr>
-          <p:nvPr/>
-        </p:nvPicPr>
-        <p:blipFill>
-          <a:blip r:embed="rId6"/>
-          <a:stretch>
-            <a:fillRect/>
-          </a:stretch>
-        </p:blipFill>
-        <p:spPr>
-          <a:xfrm>
-            <a:off x="457200" y="3771257"/>
-            <a:ext cx="5486400" cy="1645920"/>
-          </a:xfrm>
-          <a:prstGeom prst="rect">
-            <a:avLst/>
-          </a:prstGeom>
-        </p:spPr>
-      </p:pic>
-      <p:sp>
-        <p:nvSpPr>
-          <p:cNvPr id="15" name="TextBox 14">
-            <a:extLst>
-              <a:ext uri="{FF2B5EF4-FFF2-40B4-BE49-F238E27FC236}">
-                <a16:creationId xmlns:a16="http://schemas.microsoft.com/office/drawing/2014/main" id="{E6BB47C8-25BA-8C8E-7DB0-071D5D254B3E}"/>
+                <a16:creationId xmlns:a16="http://schemas.microsoft.com/office/drawing/2014/main" id="{1702C569-3FBD-3E3B-42A1-CCA6B64752D8}"/>
               </a:ext>
             </a:extLst>
           </p:cNvPr>
@@ -3546,8 +3513,8 @@
         </p:nvSpPr>
         <p:spPr>
           <a:xfrm>
-            <a:off x="729208" y="282366"/>
-            <a:ext cx="293670" cy="276999"/>
+            <a:off x="333387" y="149362"/>
+            <a:ext cx="279244" cy="252377"/>
           </a:xfrm>
           <a:prstGeom prst="rect">
             <a:avLst/>
@@ -3561,7 +3528,7 @@
           <a:lstStyle/>
           <a:p>
             <a:r>
-              <a:rPr lang="en-US" sz="1200" dirty="0">
+              <a:rPr lang="en-US" sz="1040" dirty="0">
                 <a:latin typeface="Avenir Medium" panose="02000503020000020003" pitchFamily="2" charset="0"/>
               </a:rPr>
               <a:t>A</a:t>
@@ -3571,10 +3538,10 @@
       </p:sp>
       <p:sp>
         <p:nvSpPr>
-          <p:cNvPr id="16" name="TextBox 15">
+          <p:cNvPr id="6" name="TextBox 5">
             <a:extLst>
               <a:ext uri="{FF2B5EF4-FFF2-40B4-BE49-F238E27FC236}">
-                <a16:creationId xmlns:a16="http://schemas.microsoft.com/office/drawing/2014/main" id="{8E394364-03F9-A5A3-D6EA-1D823809F20E}"/>
+                <a16:creationId xmlns:a16="http://schemas.microsoft.com/office/drawing/2014/main" id="{67D8D134-D436-69CE-89B1-7A5D8C62C976}"/>
               </a:ext>
             </a:extLst>
           </p:cNvPr>
@@ -3583,8 +3550,8 @@
         </p:nvSpPr>
         <p:spPr>
           <a:xfrm>
-            <a:off x="729208" y="1464028"/>
-            <a:ext cx="280846" cy="276999"/>
+            <a:off x="326015" y="4358727"/>
+            <a:ext cx="284052" cy="252377"/>
           </a:xfrm>
           <a:prstGeom prst="rect">
             <a:avLst/>
@@ -3598,20 +3565,20 @@
           <a:lstStyle/>
           <a:p>
             <a:r>
-              <a:rPr lang="en-US" sz="1200" dirty="0">
+              <a:rPr lang="en-US" sz="1040" dirty="0">
                 <a:latin typeface="Avenir Medium" panose="02000503020000020003" pitchFamily="2" charset="0"/>
               </a:rPr>
-              <a:t>B</a:t>
-            </a:r>
-          </a:p>
-        </p:txBody>
-      </p:sp>
-      <p:sp>
-        <p:nvSpPr>
-          <p:cNvPr id="17" name="TextBox 16">
+              <a:t>C</a:t>
+            </a:r>
+          </a:p>
+        </p:txBody>
+      </p:sp>
+      <p:sp>
+        <p:nvSpPr>
+          <p:cNvPr id="7" name="TextBox 6">
             <a:extLst>
               <a:ext uri="{FF2B5EF4-FFF2-40B4-BE49-F238E27FC236}">
-                <a16:creationId xmlns:a16="http://schemas.microsoft.com/office/drawing/2014/main" id="{44565976-D023-8999-1254-E93BB4E322EE}"/>
+                <a16:creationId xmlns:a16="http://schemas.microsoft.com/office/drawing/2014/main" id="{24505FAD-64D8-8A18-662C-1CAA388E7053}"/>
               </a:ext>
             </a:extLst>
           </p:cNvPr>
@@ -3619,9 +3586,9 @@
           <p:nvPr/>
         </p:nvSpPr>
         <p:spPr>
-          <a:xfrm>
-            <a:off x="736245" y="2697128"/>
-            <a:ext cx="293670" cy="276999"/>
+          <a:xfrm rot="16200000">
+            <a:off x="-880270" y="5098225"/>
+            <a:ext cx="1987724" cy="215444"/>
           </a:xfrm>
           <a:prstGeom prst="rect">
             <a:avLst/>
@@ -3635,20 +3602,20 @@
           <a:lstStyle/>
           <a:p>
             <a:r>
-              <a:rPr lang="en-US" sz="1200" dirty="0">
+              <a:rPr lang="en-US" sz="800" spc="-10" dirty="0">
                 <a:latin typeface="Avenir Medium" panose="02000503020000020003" pitchFamily="2" charset="0"/>
               </a:rPr>
-              <a:t>C</a:t>
-            </a:r>
-          </a:p>
-        </p:txBody>
-      </p:sp>
-      <p:sp>
-        <p:nvSpPr>
-          <p:cNvPr id="18" name="TextBox 17">
+              <a:t>Wells in areas with wildfire risk (millions)</a:t>
+            </a:r>
+          </a:p>
+        </p:txBody>
+      </p:sp>
+      <p:sp>
+        <p:nvSpPr>
+          <p:cNvPr id="8" name="TextBox 7">
             <a:extLst>
               <a:ext uri="{FF2B5EF4-FFF2-40B4-BE49-F238E27FC236}">
-                <a16:creationId xmlns:a16="http://schemas.microsoft.com/office/drawing/2014/main" id="{C93578FA-D3CB-E032-7A02-BABF004C5DAB}"/>
+                <a16:creationId xmlns:a16="http://schemas.microsoft.com/office/drawing/2014/main" id="{64836019-B851-799A-8643-884F49A020D2}"/>
               </a:ext>
             </a:extLst>
           </p:cNvPr>
@@ -3657,8 +3624,8 @@
         </p:nvSpPr>
         <p:spPr>
           <a:xfrm>
-            <a:off x="711574" y="3845277"/>
-            <a:ext cx="298480" cy="276999"/>
+            <a:off x="84564" y="4580468"/>
+            <a:ext cx="328936" cy="215444"/>
           </a:xfrm>
           <a:prstGeom prst="rect">
             <a:avLst/>
@@ -3672,10 +3639,871 @@
           <a:lstStyle/>
           <a:p>
             <a:r>
-              <a:rPr lang="en-US" sz="1200" dirty="0">
+              <a:rPr lang="en-US" sz="800" dirty="0">
                 <a:latin typeface="Avenir Medium" panose="02000503020000020003" pitchFamily="2" charset="0"/>
               </a:rPr>
-              <a:t>D</a:t>
+              <a:t>1.0</a:t>
+            </a:r>
+          </a:p>
+        </p:txBody>
+      </p:sp>
+      <p:sp>
+        <p:nvSpPr>
+          <p:cNvPr id="9" name="TextBox 8">
+            <a:extLst>
+              <a:ext uri="{FF2B5EF4-FFF2-40B4-BE49-F238E27FC236}">
+                <a16:creationId xmlns:a16="http://schemas.microsoft.com/office/drawing/2014/main" id="{82180BD5-2D4C-1812-DDF5-DF94DE67A83B}"/>
+              </a:ext>
+            </a:extLst>
+          </p:cNvPr>
+          <p:cNvSpPr txBox="1"/>
+          <p:nvPr/>
+        </p:nvSpPr>
+        <p:spPr>
+          <a:xfrm>
+            <a:off x="84564" y="5237375"/>
+            <a:ext cx="328936" cy="215444"/>
+          </a:xfrm>
+          <a:prstGeom prst="rect">
+            <a:avLst/>
+          </a:prstGeom>
+          <a:noFill/>
+        </p:spPr>
+        <p:txBody>
+          <a:bodyPr wrap="none" rtlCol="0">
+            <a:spAutoFit/>
+          </a:bodyPr>
+          <a:lstStyle/>
+          <a:p>
+            <a:r>
+              <a:rPr lang="en-US" sz="800" dirty="0">
+                <a:latin typeface="Avenir Medium" panose="02000503020000020003" pitchFamily="2" charset="0"/>
+              </a:rPr>
+              <a:t>0.5</a:t>
+            </a:r>
+          </a:p>
+        </p:txBody>
+      </p:sp>
+      <p:sp>
+        <p:nvSpPr>
+          <p:cNvPr id="10" name="TextBox 9">
+            <a:extLst>
+              <a:ext uri="{FF2B5EF4-FFF2-40B4-BE49-F238E27FC236}">
+                <a16:creationId xmlns:a16="http://schemas.microsoft.com/office/drawing/2014/main" id="{20C9E590-5F00-19D2-E39D-2092D729264F}"/>
+              </a:ext>
+            </a:extLst>
+          </p:cNvPr>
+          <p:cNvSpPr txBox="1"/>
+          <p:nvPr/>
+        </p:nvSpPr>
+        <p:spPr>
+          <a:xfrm>
+            <a:off x="165300" y="5893600"/>
+            <a:ext cx="242374" cy="215444"/>
+          </a:xfrm>
+          <a:prstGeom prst="rect">
+            <a:avLst/>
+          </a:prstGeom>
+          <a:noFill/>
+        </p:spPr>
+        <p:txBody>
+          <a:bodyPr wrap="none" rtlCol="0">
+            <a:spAutoFit/>
+          </a:bodyPr>
+          <a:lstStyle/>
+          <a:p>
+            <a:r>
+              <a:rPr lang="en-US" sz="800" dirty="0">
+                <a:latin typeface="Avenir Medium" panose="02000503020000020003" pitchFamily="2" charset="0"/>
+              </a:rPr>
+              <a:t>0</a:t>
+            </a:r>
+          </a:p>
+        </p:txBody>
+      </p:sp>
+      <p:sp>
+        <p:nvSpPr>
+          <p:cNvPr id="12" name="TextBox 11">
+            <a:extLst>
+              <a:ext uri="{FF2B5EF4-FFF2-40B4-BE49-F238E27FC236}">
+                <a16:creationId xmlns:a16="http://schemas.microsoft.com/office/drawing/2014/main" id="{B620A92A-0164-C329-F929-69EC22D5AB7E}"/>
+              </a:ext>
+            </a:extLst>
+          </p:cNvPr>
+          <p:cNvSpPr txBox="1"/>
+          <p:nvPr/>
+        </p:nvSpPr>
+        <p:spPr>
+          <a:xfrm rot="16200000">
+            <a:off x="-814175" y="870647"/>
+            <a:ext cx="1848583" cy="215444"/>
+          </a:xfrm>
+          <a:prstGeom prst="rect">
+            <a:avLst/>
+          </a:prstGeom>
+          <a:noFill/>
+        </p:spPr>
+        <p:txBody>
+          <a:bodyPr wrap="none" rtlCol="0">
+            <a:spAutoFit/>
+          </a:bodyPr>
+          <a:lstStyle/>
+          <a:p>
+            <a:r>
+              <a:rPr lang="en-US" sz="800" spc="-30" dirty="0">
+                <a:latin typeface="Avenir Medium" panose="02000503020000020003" pitchFamily="2" charset="0"/>
+              </a:rPr>
+              <a:t>Wells in wildfire burn areas (thousands)</a:t>
+            </a:r>
+          </a:p>
+        </p:txBody>
+      </p:sp>
+      <p:sp>
+        <p:nvSpPr>
+          <p:cNvPr id="13" name="TextBox 12">
+            <a:extLst>
+              <a:ext uri="{FF2B5EF4-FFF2-40B4-BE49-F238E27FC236}">
+                <a16:creationId xmlns:a16="http://schemas.microsoft.com/office/drawing/2014/main" id="{9E4C2425-3373-F59F-726F-2A694DBB9C6A}"/>
+              </a:ext>
+            </a:extLst>
+          </p:cNvPr>
+          <p:cNvSpPr txBox="1"/>
+          <p:nvPr/>
+        </p:nvSpPr>
+        <p:spPr>
+          <a:xfrm rot="16200000">
+            <a:off x="-1011808" y="2889419"/>
+            <a:ext cx="2243884" cy="215444"/>
+          </a:xfrm>
+          <a:prstGeom prst="rect">
+            <a:avLst/>
+          </a:prstGeom>
+          <a:noFill/>
+        </p:spPr>
+        <p:txBody>
+          <a:bodyPr wrap="none" rtlCol="0">
+            <a:spAutoFit/>
+          </a:bodyPr>
+          <a:lstStyle/>
+          <a:p>
+            <a:r>
+              <a:rPr lang="en-US" sz="800" spc="-30" dirty="0">
+                <a:latin typeface="Avenir Medium" panose="02000503020000020003" pitchFamily="2" charset="0"/>
+              </a:rPr>
+              <a:t>Pop. within 1 km of wells  in burn areas (millions)</a:t>
+            </a:r>
+          </a:p>
+        </p:txBody>
+      </p:sp>
+      <p:sp>
+        <p:nvSpPr>
+          <p:cNvPr id="14" name="TextBox 13">
+            <a:extLst>
+              <a:ext uri="{FF2B5EF4-FFF2-40B4-BE49-F238E27FC236}">
+                <a16:creationId xmlns:a16="http://schemas.microsoft.com/office/drawing/2014/main" id="{42874178-F658-634A-696E-A88D30841390}"/>
+              </a:ext>
+            </a:extLst>
+          </p:cNvPr>
+          <p:cNvSpPr txBox="1"/>
+          <p:nvPr/>
+        </p:nvSpPr>
+        <p:spPr>
+          <a:xfrm>
+            <a:off x="101400" y="361683"/>
+            <a:ext cx="300082" cy="215444"/>
+          </a:xfrm>
+          <a:prstGeom prst="rect">
+            <a:avLst/>
+          </a:prstGeom>
+          <a:noFill/>
+        </p:spPr>
+        <p:txBody>
+          <a:bodyPr wrap="none" rtlCol="0">
+            <a:spAutoFit/>
+          </a:bodyPr>
+          <a:lstStyle/>
+          <a:p>
+            <a:pPr algn="r"/>
+            <a:r>
+              <a:rPr lang="en-US" sz="800" dirty="0">
+                <a:latin typeface="Avenir Medium" panose="02000503020000020003" pitchFamily="2" charset="0"/>
+              </a:rPr>
+              <a:t>15</a:t>
+            </a:r>
+          </a:p>
+        </p:txBody>
+      </p:sp>
+      <p:sp>
+        <p:nvSpPr>
+          <p:cNvPr id="15" name="TextBox 14">
+            <a:extLst>
+              <a:ext uri="{FF2B5EF4-FFF2-40B4-BE49-F238E27FC236}">
+                <a16:creationId xmlns:a16="http://schemas.microsoft.com/office/drawing/2014/main" id="{68088E56-F7BD-D6C9-9374-C4DC28D8E380}"/>
+              </a:ext>
+            </a:extLst>
+          </p:cNvPr>
+          <p:cNvSpPr txBox="1"/>
+          <p:nvPr/>
+        </p:nvSpPr>
+        <p:spPr>
+          <a:xfrm>
+            <a:off x="111502" y="762034"/>
+            <a:ext cx="300082" cy="215444"/>
+          </a:xfrm>
+          <a:prstGeom prst="rect">
+            <a:avLst/>
+          </a:prstGeom>
+          <a:noFill/>
+        </p:spPr>
+        <p:txBody>
+          <a:bodyPr wrap="none" rtlCol="0">
+            <a:spAutoFit/>
+          </a:bodyPr>
+          <a:lstStyle/>
+          <a:p>
+            <a:pPr algn="r"/>
+            <a:r>
+              <a:rPr lang="en-US" sz="800" dirty="0">
+                <a:latin typeface="Avenir Medium" panose="02000503020000020003" pitchFamily="2" charset="0"/>
+              </a:rPr>
+              <a:t>10</a:t>
+            </a:r>
+          </a:p>
+        </p:txBody>
+      </p:sp>
+      <p:sp>
+        <p:nvSpPr>
+          <p:cNvPr id="16" name="TextBox 15">
+            <a:extLst>
+              <a:ext uri="{FF2B5EF4-FFF2-40B4-BE49-F238E27FC236}">
+                <a16:creationId xmlns:a16="http://schemas.microsoft.com/office/drawing/2014/main" id="{648A7F5F-DA52-A082-005E-B1AB1CF8A8E6}"/>
+              </a:ext>
+            </a:extLst>
+          </p:cNvPr>
+          <p:cNvSpPr txBox="1"/>
+          <p:nvPr/>
+        </p:nvSpPr>
+        <p:spPr>
+          <a:xfrm>
+            <a:off x="154694" y="1567557"/>
+            <a:ext cx="242374" cy="215444"/>
+          </a:xfrm>
+          <a:prstGeom prst="rect">
+            <a:avLst/>
+          </a:prstGeom>
+          <a:noFill/>
+        </p:spPr>
+        <p:txBody>
+          <a:bodyPr wrap="none" rtlCol="0">
+            <a:spAutoFit/>
+          </a:bodyPr>
+          <a:lstStyle/>
+          <a:p>
+            <a:pPr algn="r"/>
+            <a:r>
+              <a:rPr lang="en-US" sz="800" dirty="0">
+                <a:latin typeface="Avenir Medium" panose="02000503020000020003" pitchFamily="2" charset="0"/>
+              </a:rPr>
+              <a:t>0</a:t>
+            </a:r>
+          </a:p>
+        </p:txBody>
+      </p:sp>
+      <p:sp>
+        <p:nvSpPr>
+          <p:cNvPr id="17" name="TextBox 16">
+            <a:extLst>
+              <a:ext uri="{FF2B5EF4-FFF2-40B4-BE49-F238E27FC236}">
+                <a16:creationId xmlns:a16="http://schemas.microsoft.com/office/drawing/2014/main" id="{E2A8BDD5-7745-5DCD-C729-98243C5D6C30}"/>
+              </a:ext>
+            </a:extLst>
+          </p:cNvPr>
+          <p:cNvSpPr txBox="1"/>
+          <p:nvPr/>
+        </p:nvSpPr>
+        <p:spPr>
+          <a:xfrm>
+            <a:off x="1659053" y="6233253"/>
+            <a:ext cx="747320" cy="215444"/>
+          </a:xfrm>
+          <a:prstGeom prst="rect">
+            <a:avLst/>
+          </a:prstGeom>
+          <a:noFill/>
+        </p:spPr>
+        <p:txBody>
+          <a:bodyPr wrap="none" rtlCol="0">
+            <a:spAutoFit/>
+          </a:bodyPr>
+          <a:lstStyle/>
+          <a:p>
+            <a:pPr algn="ctr"/>
+            <a:r>
+              <a:rPr lang="en-US" sz="800" dirty="0">
+                <a:latin typeface="Avenir Medium" panose="02000503020000020003" pitchFamily="2" charset="0"/>
+              </a:rPr>
+              <a:t>Time Period</a:t>
+            </a:r>
+          </a:p>
+        </p:txBody>
+      </p:sp>
+      <p:sp>
+        <p:nvSpPr>
+          <p:cNvPr id="18" name="TextBox 17">
+            <a:extLst>
+              <a:ext uri="{FF2B5EF4-FFF2-40B4-BE49-F238E27FC236}">
+                <a16:creationId xmlns:a16="http://schemas.microsoft.com/office/drawing/2014/main" id="{D3E03333-98A3-A35C-2A39-FB40F755238B}"/>
+              </a:ext>
+            </a:extLst>
+          </p:cNvPr>
+          <p:cNvSpPr txBox="1"/>
+          <p:nvPr/>
+        </p:nvSpPr>
+        <p:spPr>
+          <a:xfrm>
+            <a:off x="1724174" y="3996641"/>
+            <a:ext cx="396262" cy="215444"/>
+          </a:xfrm>
+          <a:prstGeom prst="rect">
+            <a:avLst/>
+          </a:prstGeom>
+          <a:noFill/>
+        </p:spPr>
+        <p:txBody>
+          <a:bodyPr wrap="none" rtlCol="0">
+            <a:spAutoFit/>
+          </a:bodyPr>
+          <a:lstStyle/>
+          <a:p>
+            <a:pPr algn="ctr"/>
+            <a:r>
+              <a:rPr lang="en-US" sz="800" dirty="0">
+                <a:latin typeface="Avenir Medium" panose="02000503020000020003" pitchFamily="2" charset="0"/>
+              </a:rPr>
+              <a:t>Year</a:t>
+            </a:r>
+          </a:p>
+        </p:txBody>
+      </p:sp>
+      <p:sp>
+        <p:nvSpPr>
+          <p:cNvPr id="19" name="Rectangle 18">
+            <a:extLst>
+              <a:ext uri="{FF2B5EF4-FFF2-40B4-BE49-F238E27FC236}">
+                <a16:creationId xmlns:a16="http://schemas.microsoft.com/office/drawing/2014/main" id="{FD8D2394-0CD9-D541-1835-6BD77927CCE0}"/>
+              </a:ext>
+            </a:extLst>
+          </p:cNvPr>
+          <p:cNvSpPr/>
+          <p:nvPr/>
+        </p:nvSpPr>
+        <p:spPr>
+          <a:xfrm>
+            <a:off x="481589" y="2168103"/>
+            <a:ext cx="3102248" cy="1613934"/>
+          </a:xfrm>
+          <a:prstGeom prst="rect">
+            <a:avLst/>
+          </a:prstGeom>
+          <a:solidFill>
+            <a:schemeClr val="bg1"/>
+          </a:solidFill>
+          <a:ln>
+            <a:noFill/>
+          </a:ln>
+        </p:spPr>
+        <p:style>
+          <a:lnRef idx="2">
+            <a:schemeClr val="accent1">
+              <a:shade val="50000"/>
+            </a:schemeClr>
+          </a:lnRef>
+          <a:fillRef idx="1">
+            <a:schemeClr val="accent1"/>
+          </a:fillRef>
+          <a:effectRef idx="0">
+            <a:schemeClr val="accent1"/>
+          </a:effectRef>
+          <a:fontRef idx="minor">
+            <a:schemeClr val="lt1"/>
+          </a:fontRef>
+        </p:style>
+        <p:txBody>
+          <a:bodyPr rtlCol="0" anchor="ctr"/>
+          <a:lstStyle/>
+          <a:p>
+            <a:pPr algn="ctr"/>
+            <a:endParaRPr lang="en-US"/>
+          </a:p>
+        </p:txBody>
+      </p:sp>
+      <p:sp>
+        <p:nvSpPr>
+          <p:cNvPr id="20" name="TextBox 19">
+            <a:extLst>
+              <a:ext uri="{FF2B5EF4-FFF2-40B4-BE49-F238E27FC236}">
+                <a16:creationId xmlns:a16="http://schemas.microsoft.com/office/drawing/2014/main" id="{A1A52FA1-28FB-DC34-8F0D-44D65CD74A83}"/>
+              </a:ext>
+            </a:extLst>
+          </p:cNvPr>
+          <p:cNvSpPr txBox="1"/>
+          <p:nvPr/>
+        </p:nvSpPr>
+        <p:spPr>
+          <a:xfrm>
+            <a:off x="333387" y="2126908"/>
+            <a:ext cx="268022" cy="252377"/>
+          </a:xfrm>
+          <a:prstGeom prst="rect">
+            <a:avLst/>
+          </a:prstGeom>
+          <a:noFill/>
+        </p:spPr>
+        <p:txBody>
+          <a:bodyPr wrap="none" rtlCol="0">
+            <a:spAutoFit/>
+          </a:bodyPr>
+          <a:lstStyle/>
+          <a:p>
+            <a:r>
+              <a:rPr lang="en-US" sz="1040" dirty="0">
+                <a:latin typeface="Avenir Medium" panose="02000503020000020003" pitchFamily="2" charset="0"/>
+              </a:rPr>
+              <a:t>B</a:t>
+            </a:r>
+          </a:p>
+        </p:txBody>
+      </p:sp>
+      <p:sp>
+        <p:nvSpPr>
+          <p:cNvPr id="21" name="TextBox 20">
+            <a:extLst>
+              <a:ext uri="{FF2B5EF4-FFF2-40B4-BE49-F238E27FC236}">
+                <a16:creationId xmlns:a16="http://schemas.microsoft.com/office/drawing/2014/main" id="{9EE30BBE-69E2-CB79-83AA-38552F72D05C}"/>
+              </a:ext>
+            </a:extLst>
+          </p:cNvPr>
+          <p:cNvSpPr txBox="1"/>
+          <p:nvPr/>
+        </p:nvSpPr>
+        <p:spPr>
+          <a:xfrm>
+            <a:off x="154694" y="1164151"/>
+            <a:ext cx="242374" cy="215444"/>
+          </a:xfrm>
+          <a:prstGeom prst="rect">
+            <a:avLst/>
+          </a:prstGeom>
+          <a:noFill/>
+        </p:spPr>
+        <p:txBody>
+          <a:bodyPr wrap="none" rtlCol="0">
+            <a:spAutoFit/>
+          </a:bodyPr>
+          <a:lstStyle/>
+          <a:p>
+            <a:pPr algn="r"/>
+            <a:r>
+              <a:rPr lang="en-US" sz="800" dirty="0">
+                <a:latin typeface="Avenir Medium" panose="02000503020000020003" pitchFamily="2" charset="0"/>
+              </a:rPr>
+              <a:t>5</a:t>
+            </a:r>
+          </a:p>
+        </p:txBody>
+      </p:sp>
+      <p:sp>
+        <p:nvSpPr>
+          <p:cNvPr id="24" name="Rectangle 23">
+            <a:extLst>
+              <a:ext uri="{FF2B5EF4-FFF2-40B4-BE49-F238E27FC236}">
+                <a16:creationId xmlns:a16="http://schemas.microsoft.com/office/drawing/2014/main" id="{33E2DB33-5842-6475-550B-F85AC34640CA}"/>
+              </a:ext>
+            </a:extLst>
+          </p:cNvPr>
+          <p:cNvSpPr>
+            <a:spLocks noChangeAspect="1"/>
+          </p:cNvSpPr>
+          <p:nvPr/>
+        </p:nvSpPr>
+        <p:spPr>
+          <a:xfrm>
+            <a:off x="591185" y="4415111"/>
+            <a:ext cx="137160" cy="137160"/>
+          </a:xfrm>
+          <a:prstGeom prst="rect">
+            <a:avLst/>
+          </a:prstGeom>
+          <a:solidFill>
+            <a:srgbClr val="999999"/>
+          </a:solidFill>
+          <a:ln>
+            <a:solidFill>
+              <a:srgbClr val="000000"/>
+            </a:solidFill>
+          </a:ln>
+        </p:spPr>
+        <p:style>
+          <a:lnRef idx="2">
+            <a:schemeClr val="accent1">
+              <a:shade val="50000"/>
+            </a:schemeClr>
+          </a:lnRef>
+          <a:fillRef idx="1">
+            <a:schemeClr val="accent1"/>
+          </a:fillRef>
+          <a:effectRef idx="0">
+            <a:schemeClr val="accent1"/>
+          </a:effectRef>
+          <a:fontRef idx="minor">
+            <a:schemeClr val="lt1"/>
+          </a:fontRef>
+        </p:style>
+        <p:txBody>
+          <a:bodyPr rtlCol="0" anchor="ctr"/>
+          <a:lstStyle/>
+          <a:p>
+            <a:pPr algn="ctr"/>
+            <a:endParaRPr lang="en-US" dirty="0"/>
+          </a:p>
+        </p:txBody>
+      </p:sp>
+      <p:sp>
+        <p:nvSpPr>
+          <p:cNvPr id="25" name="TextBox 24">
+            <a:extLst>
+              <a:ext uri="{FF2B5EF4-FFF2-40B4-BE49-F238E27FC236}">
+                <a16:creationId xmlns:a16="http://schemas.microsoft.com/office/drawing/2014/main" id="{65F4FF9D-448F-8FBA-C2E5-C5B22148ED5F}"/>
+              </a:ext>
+            </a:extLst>
+          </p:cNvPr>
+          <p:cNvSpPr txBox="1"/>
+          <p:nvPr/>
+        </p:nvSpPr>
+        <p:spPr>
+          <a:xfrm>
+            <a:off x="671679" y="4379449"/>
+            <a:ext cx="2220761" cy="215444"/>
+          </a:xfrm>
+          <a:prstGeom prst="rect">
+            <a:avLst/>
+          </a:prstGeom>
+          <a:noFill/>
+        </p:spPr>
+        <p:txBody>
+          <a:bodyPr wrap="square" rtlCol="0">
+            <a:spAutoFit/>
+          </a:bodyPr>
+          <a:lstStyle/>
+          <a:p>
+            <a:r>
+              <a:rPr lang="en-US" sz="800" spc="-30" dirty="0">
+                <a:latin typeface="Avenir Book" panose="02000503020000020003" pitchFamily="2" charset="0"/>
+                <a:cs typeface="Arial" panose="020B0604020202020204" pitchFamily="34" charset="0"/>
+              </a:rPr>
+              <a:t>Moderately high wildfire risk (KBDI ≥ 450)</a:t>
+            </a:r>
+          </a:p>
+        </p:txBody>
+      </p:sp>
+      <p:sp>
+        <p:nvSpPr>
+          <p:cNvPr id="26" name="TextBox 25">
+            <a:extLst>
+              <a:ext uri="{FF2B5EF4-FFF2-40B4-BE49-F238E27FC236}">
+                <a16:creationId xmlns:a16="http://schemas.microsoft.com/office/drawing/2014/main" id="{855A6525-0F04-EB3E-212E-10192617A3A7}"/>
+              </a:ext>
+            </a:extLst>
+          </p:cNvPr>
+          <p:cNvSpPr txBox="1"/>
+          <p:nvPr/>
+        </p:nvSpPr>
+        <p:spPr>
+          <a:xfrm>
+            <a:off x="671679" y="4578792"/>
+            <a:ext cx="1811328" cy="215444"/>
+          </a:xfrm>
+          <a:prstGeom prst="rect">
+            <a:avLst/>
+          </a:prstGeom>
+          <a:noFill/>
+        </p:spPr>
+        <p:txBody>
+          <a:bodyPr wrap="square">
+            <a:spAutoFit/>
+          </a:bodyPr>
+          <a:lstStyle/>
+          <a:p>
+            <a:r>
+              <a:rPr lang="en-US" sz="800" spc="-30" dirty="0">
+                <a:latin typeface="Avenir Book" panose="02000503020000020003" pitchFamily="2" charset="0"/>
+                <a:cs typeface="Arial" panose="020B0604020202020204" pitchFamily="34" charset="0"/>
+              </a:rPr>
+              <a:t>High wildfire risk (KBDI ≥ 600)</a:t>
+            </a:r>
+          </a:p>
+        </p:txBody>
+      </p:sp>
+      <p:sp>
+        <p:nvSpPr>
+          <p:cNvPr id="27" name="Rectangle 26">
+            <a:extLst>
+              <a:ext uri="{FF2B5EF4-FFF2-40B4-BE49-F238E27FC236}">
+                <a16:creationId xmlns:a16="http://schemas.microsoft.com/office/drawing/2014/main" id="{DE0F7C02-C6EC-98A0-F0E3-6882CCA1D688}"/>
+              </a:ext>
+            </a:extLst>
+          </p:cNvPr>
+          <p:cNvSpPr>
+            <a:spLocks noChangeAspect="1"/>
+          </p:cNvSpPr>
+          <p:nvPr/>
+        </p:nvSpPr>
+        <p:spPr>
+          <a:xfrm>
+            <a:off x="591185" y="4613652"/>
+            <a:ext cx="137160" cy="136627"/>
+          </a:xfrm>
+          <a:prstGeom prst="rect">
+            <a:avLst/>
+          </a:prstGeom>
+          <a:solidFill>
+            <a:srgbClr val="404040"/>
+          </a:solidFill>
+          <a:ln>
+            <a:solidFill>
+              <a:srgbClr val="000000"/>
+            </a:solidFill>
+          </a:ln>
+        </p:spPr>
+        <p:style>
+          <a:lnRef idx="2">
+            <a:schemeClr val="accent1">
+              <a:shade val="50000"/>
+            </a:schemeClr>
+          </a:lnRef>
+          <a:fillRef idx="1">
+            <a:schemeClr val="accent1"/>
+          </a:fillRef>
+          <a:effectRef idx="0">
+            <a:schemeClr val="accent1"/>
+          </a:effectRef>
+          <a:fontRef idx="minor">
+            <a:schemeClr val="lt1"/>
+          </a:fontRef>
+        </p:style>
+        <p:txBody>
+          <a:bodyPr rtlCol="0" anchor="ctr"/>
+          <a:lstStyle/>
+          <a:p>
+            <a:pPr algn="ctr"/>
+            <a:endParaRPr lang="en-US" dirty="0"/>
+          </a:p>
+        </p:txBody>
+      </p:sp>
+      <p:sp>
+        <p:nvSpPr>
+          <p:cNvPr id="28" name="Rectangle 27">
+            <a:extLst>
+              <a:ext uri="{FF2B5EF4-FFF2-40B4-BE49-F238E27FC236}">
+                <a16:creationId xmlns:a16="http://schemas.microsoft.com/office/drawing/2014/main" id="{A2C0DD85-9312-18CC-B81F-270B4D325BEB}"/>
+              </a:ext>
+            </a:extLst>
+          </p:cNvPr>
+          <p:cNvSpPr>
+            <a:spLocks noChangeAspect="1"/>
+          </p:cNvSpPr>
+          <p:nvPr/>
+        </p:nvSpPr>
+        <p:spPr>
+          <a:xfrm>
+            <a:off x="3429230" y="3900242"/>
+            <a:ext cx="332348" cy="133399"/>
+          </a:xfrm>
+          <a:prstGeom prst="rect">
+            <a:avLst/>
+          </a:prstGeom>
+          <a:solidFill>
+            <a:schemeClr val="bg1"/>
+          </a:solidFill>
+          <a:ln>
+            <a:solidFill>
+              <a:schemeClr val="bg1"/>
+            </a:solidFill>
+          </a:ln>
+        </p:spPr>
+        <p:style>
+          <a:lnRef idx="2">
+            <a:schemeClr val="accent1">
+              <a:shade val="50000"/>
+            </a:schemeClr>
+          </a:lnRef>
+          <a:fillRef idx="1">
+            <a:schemeClr val="accent1"/>
+          </a:fillRef>
+          <a:effectRef idx="0">
+            <a:schemeClr val="accent1"/>
+          </a:effectRef>
+          <a:fontRef idx="minor">
+            <a:schemeClr val="lt1"/>
+          </a:fontRef>
+        </p:style>
+        <p:txBody>
+          <a:bodyPr rtlCol="0" anchor="ctr"/>
+          <a:lstStyle/>
+          <a:p>
+            <a:pPr algn="ctr"/>
+            <a:endParaRPr lang="en-US" dirty="0"/>
+          </a:p>
+        </p:txBody>
+      </p:sp>
+      <p:sp>
+        <p:nvSpPr>
+          <p:cNvPr id="29" name="TextBox 28">
+            <a:extLst>
+              <a:ext uri="{FF2B5EF4-FFF2-40B4-BE49-F238E27FC236}">
+                <a16:creationId xmlns:a16="http://schemas.microsoft.com/office/drawing/2014/main" id="{0CEB1B64-0AE8-FA63-50F4-9531B7A38169}"/>
+              </a:ext>
+            </a:extLst>
+          </p:cNvPr>
+          <p:cNvSpPr txBox="1"/>
+          <p:nvPr/>
+        </p:nvSpPr>
+        <p:spPr>
+          <a:xfrm>
+            <a:off x="107592" y="2272896"/>
+            <a:ext cx="300082" cy="215444"/>
+          </a:xfrm>
+          <a:prstGeom prst="rect">
+            <a:avLst/>
+          </a:prstGeom>
+          <a:noFill/>
+        </p:spPr>
+        <p:txBody>
+          <a:bodyPr wrap="none" rtlCol="0">
+            <a:spAutoFit/>
+          </a:bodyPr>
+          <a:lstStyle/>
+          <a:p>
+            <a:pPr algn="r"/>
+            <a:r>
+              <a:rPr lang="en-US" sz="800" dirty="0">
+                <a:latin typeface="Avenir Medium" panose="02000503020000020003" pitchFamily="2" charset="0"/>
+              </a:rPr>
+              <a:t>15</a:t>
+            </a:r>
+          </a:p>
+        </p:txBody>
+      </p:sp>
+      <p:sp>
+        <p:nvSpPr>
+          <p:cNvPr id="30" name="TextBox 29">
+            <a:extLst>
+              <a:ext uri="{FF2B5EF4-FFF2-40B4-BE49-F238E27FC236}">
+                <a16:creationId xmlns:a16="http://schemas.microsoft.com/office/drawing/2014/main" id="{E3A02582-31E1-0FC3-82BC-D630B63EA4DA}"/>
+              </a:ext>
+            </a:extLst>
+          </p:cNvPr>
+          <p:cNvSpPr txBox="1"/>
+          <p:nvPr/>
+        </p:nvSpPr>
+        <p:spPr>
+          <a:xfrm>
+            <a:off x="117694" y="2973575"/>
+            <a:ext cx="300082" cy="215444"/>
+          </a:xfrm>
+          <a:prstGeom prst="rect">
+            <a:avLst/>
+          </a:prstGeom>
+          <a:noFill/>
+        </p:spPr>
+        <p:txBody>
+          <a:bodyPr wrap="none" rtlCol="0">
+            <a:spAutoFit/>
+          </a:bodyPr>
+          <a:lstStyle/>
+          <a:p>
+            <a:pPr algn="r"/>
+            <a:r>
+              <a:rPr lang="en-US" sz="800" dirty="0">
+                <a:latin typeface="Avenir Medium" panose="02000503020000020003" pitchFamily="2" charset="0"/>
+              </a:rPr>
+              <a:t>10</a:t>
+            </a:r>
+          </a:p>
+        </p:txBody>
+      </p:sp>
+      <p:sp>
+        <p:nvSpPr>
+          <p:cNvPr id="31" name="TextBox 30">
+            <a:extLst>
+              <a:ext uri="{FF2B5EF4-FFF2-40B4-BE49-F238E27FC236}">
+                <a16:creationId xmlns:a16="http://schemas.microsoft.com/office/drawing/2014/main" id="{61E588FF-A1C6-C61E-C9D0-D5A40FF0D286}"/>
+              </a:ext>
+            </a:extLst>
+          </p:cNvPr>
+          <p:cNvSpPr txBox="1"/>
+          <p:nvPr/>
+        </p:nvSpPr>
+        <p:spPr>
+          <a:xfrm>
+            <a:off x="160886" y="3663865"/>
+            <a:ext cx="242374" cy="215444"/>
+          </a:xfrm>
+          <a:prstGeom prst="rect">
+            <a:avLst/>
+          </a:prstGeom>
+          <a:noFill/>
+        </p:spPr>
+        <p:txBody>
+          <a:bodyPr wrap="none" rtlCol="0">
+            <a:spAutoFit/>
+          </a:bodyPr>
+          <a:lstStyle/>
+          <a:p>
+            <a:pPr algn="r"/>
+            <a:r>
+              <a:rPr lang="en-US" sz="800" dirty="0">
+                <a:latin typeface="Avenir Medium" panose="02000503020000020003" pitchFamily="2" charset="0"/>
+              </a:rPr>
+              <a:t>0</a:t>
+            </a:r>
+          </a:p>
+        </p:txBody>
+      </p:sp>
+      <p:sp>
+        <p:nvSpPr>
+          <p:cNvPr id="32" name="TextBox 31">
+            <a:extLst>
+              <a:ext uri="{FF2B5EF4-FFF2-40B4-BE49-F238E27FC236}">
+                <a16:creationId xmlns:a16="http://schemas.microsoft.com/office/drawing/2014/main" id="{ADA8AA52-A567-D316-0114-150F2F132AFF}"/>
+              </a:ext>
+            </a:extLst>
+          </p:cNvPr>
+          <p:cNvSpPr txBox="1"/>
+          <p:nvPr/>
+        </p:nvSpPr>
+        <p:spPr>
+          <a:xfrm>
+            <a:off x="160886" y="3324247"/>
+            <a:ext cx="242374" cy="215444"/>
+          </a:xfrm>
+          <a:prstGeom prst="rect">
+            <a:avLst/>
+          </a:prstGeom>
+          <a:noFill/>
+        </p:spPr>
+        <p:txBody>
+          <a:bodyPr wrap="none" rtlCol="0">
+            <a:spAutoFit/>
+          </a:bodyPr>
+          <a:lstStyle/>
+          <a:p>
+            <a:pPr algn="r"/>
+            <a:r>
+              <a:rPr lang="en-US" sz="800" dirty="0">
+                <a:latin typeface="Avenir Medium" panose="02000503020000020003" pitchFamily="2" charset="0"/>
+              </a:rPr>
+              <a:t>5</a:t>
             </a:r>
           </a:p>
         </p:txBody>
@@ -3696,7 +4524,7 @@
 <file path=ppt/theme/theme1.xml><?xml version="1.0" encoding="utf-8"?>
 <a:theme xmlns:a="http://schemas.openxmlformats.org/drawingml/2006/main" name="Office Theme">
   <a:themeElements>
-    <a:clrScheme name="Office Theme 2013 - 2022">
+    <a:clrScheme name="Office Theme">
       <a:dk1>
         <a:sysClr val="windowText" lastClr="000000"/>
       </a:dk1>
@@ -3734,7 +4562,7 @@
         <a:srgbClr val="954F72"/>
       </a:folHlink>
     </a:clrScheme>
-    <a:fontScheme name="Office Theme 2013 - 2022">
+    <a:fontScheme name="Office Theme">
       <a:majorFont>
         <a:latin typeface="Calibri Light" panose="020F0302020204030204"/>
         <a:ea typeface=""/>
@@ -3806,7 +4634,7 @@
         <a:font script="Geor" typeface="Sylfaen"/>
       </a:minorFont>
     </a:fontScheme>
-    <a:fmtScheme name="Office Theme 2013 - 2022">
+    <a:fmtScheme name="Office Theme">
       <a:fillStyleLst>
         <a:solidFill>
           <a:schemeClr val="phClr"/>

</xml_diff>

<commit_message>
Further revisions to Figure 3 script; editing results scripts to restrict to 1984–2019
</commit_message>
<xml_diff>
--- a/output/figures/components/figure_3.pptx
+++ b/output/figures/components/figure_3.pptx
@@ -4135,7 +4135,7 @@
             <a:avLst/>
           </a:prstGeom>
           <a:solidFill>
-            <a:srgbClr val="999999"/>
+            <a:srgbClr val="9D7FC7"/>
           </a:solidFill>
           <a:ln>
             <a:solidFill>
@@ -4267,7 +4267,7 @@
             <a:avLst/>
           </a:prstGeom>
           <a:solidFill>
-            <a:srgbClr val="404040"/>
+            <a:srgbClr val="FFB3DF"/>
           </a:solidFill>
           <a:ln>
             <a:solidFill>

</xml_diff>

<commit_message>
Revising figures, code to get results for retrospective assessments
</commit_message>
<xml_diff>
--- a/output/figures/components/figure_3.pptx
+++ b/output/figures/components/figure_3.pptx
@@ -197,7 +197,7 @@
           <a:p>
             <a:fld id="{A16B860A-9A1A-144A-96A5-5B32CEA06BBF}" type="datetimeFigureOut">
               <a:rPr lang="en-US" smtClean="0"/>
-              <a:t>2/15/23</a:t>
+              <a:t>3/22/23</a:t>
             </a:fld>
             <a:endParaRPr lang="en-US"/>
           </a:p>
@@ -684,7 +684,7 @@
           <a:p>
             <a:fld id="{E053DD94-EF7D-4B46-90DA-1D86C84E35B6}" type="datetimeFigureOut">
               <a:rPr lang="en-US" smtClean="0"/>
-              <a:t>2/15/23</a:t>
+              <a:t>3/22/23</a:t>
             </a:fld>
             <a:endParaRPr lang="en-US"/>
           </a:p>
@@ -854,7 +854,7 @@
           <a:p>
             <a:fld id="{E053DD94-EF7D-4B46-90DA-1D86C84E35B6}" type="datetimeFigureOut">
               <a:rPr lang="en-US" smtClean="0"/>
-              <a:t>2/15/23</a:t>
+              <a:t>3/22/23</a:t>
             </a:fld>
             <a:endParaRPr lang="en-US"/>
           </a:p>
@@ -1034,7 +1034,7 @@
           <a:p>
             <a:fld id="{E053DD94-EF7D-4B46-90DA-1D86C84E35B6}" type="datetimeFigureOut">
               <a:rPr lang="en-US" smtClean="0"/>
-              <a:t>2/15/23</a:t>
+              <a:t>3/22/23</a:t>
             </a:fld>
             <a:endParaRPr lang="en-US"/>
           </a:p>
@@ -1204,7 +1204,7 @@
           <a:p>
             <a:fld id="{E053DD94-EF7D-4B46-90DA-1D86C84E35B6}" type="datetimeFigureOut">
               <a:rPr lang="en-US" smtClean="0"/>
-              <a:t>2/15/23</a:t>
+              <a:t>3/22/23</a:t>
             </a:fld>
             <a:endParaRPr lang="en-US"/>
           </a:p>
@@ -1448,7 +1448,7 @@
           <a:p>
             <a:fld id="{E053DD94-EF7D-4B46-90DA-1D86C84E35B6}" type="datetimeFigureOut">
               <a:rPr lang="en-US" smtClean="0"/>
-              <a:t>2/15/23</a:t>
+              <a:t>3/22/23</a:t>
             </a:fld>
             <a:endParaRPr lang="en-US"/>
           </a:p>
@@ -1680,7 +1680,7 @@
           <a:p>
             <a:fld id="{E053DD94-EF7D-4B46-90DA-1D86C84E35B6}" type="datetimeFigureOut">
               <a:rPr lang="en-US" smtClean="0"/>
-              <a:t>2/15/23</a:t>
+              <a:t>3/22/23</a:t>
             </a:fld>
             <a:endParaRPr lang="en-US"/>
           </a:p>
@@ -2047,7 +2047,7 @@
           <a:p>
             <a:fld id="{E053DD94-EF7D-4B46-90DA-1D86C84E35B6}" type="datetimeFigureOut">
               <a:rPr lang="en-US" smtClean="0"/>
-              <a:t>2/15/23</a:t>
+              <a:t>3/22/23</a:t>
             </a:fld>
             <a:endParaRPr lang="en-US"/>
           </a:p>
@@ -2165,7 +2165,7 @@
           <a:p>
             <a:fld id="{E053DD94-EF7D-4B46-90DA-1D86C84E35B6}" type="datetimeFigureOut">
               <a:rPr lang="en-US" smtClean="0"/>
-              <a:t>2/15/23</a:t>
+              <a:t>3/22/23</a:t>
             </a:fld>
             <a:endParaRPr lang="en-US"/>
           </a:p>
@@ -2260,7 +2260,7 @@
           <a:p>
             <a:fld id="{E053DD94-EF7D-4B46-90DA-1D86C84E35B6}" type="datetimeFigureOut">
               <a:rPr lang="en-US" smtClean="0"/>
-              <a:t>2/15/23</a:t>
+              <a:t>3/22/23</a:t>
             </a:fld>
             <a:endParaRPr lang="en-US"/>
           </a:p>
@@ -2537,7 +2537,7 @@
           <a:p>
             <a:fld id="{E053DD94-EF7D-4B46-90DA-1D86C84E35B6}" type="datetimeFigureOut">
               <a:rPr lang="en-US" smtClean="0"/>
-              <a:t>2/15/23</a:t>
+              <a:t>3/22/23</a:t>
             </a:fld>
             <a:endParaRPr lang="en-US"/>
           </a:p>
@@ -2794,7 +2794,7 @@
           <a:p>
             <a:fld id="{E053DD94-EF7D-4B46-90DA-1D86C84E35B6}" type="datetimeFigureOut">
               <a:rPr lang="en-US" smtClean="0"/>
-              <a:t>2/15/23</a:t>
+              <a:t>3/22/23</a:t>
             </a:fld>
             <a:endParaRPr lang="en-US"/>
           </a:p>
@@ -3007,7 +3007,7 @@
           <a:p>
             <a:fld id="{E053DD94-EF7D-4B46-90DA-1D86C84E35B6}" type="datetimeFigureOut">
               <a:rPr lang="en-US" smtClean="0"/>
-              <a:t>2/15/23</a:t>
+              <a:t>3/22/23</a:t>
             </a:fld>
             <a:endParaRPr lang="en-US"/>
           </a:p>
@@ -3433,7 +3433,7 @@
         </p:blipFill>
         <p:spPr>
           <a:xfrm>
-            <a:off x="98575" y="78621"/>
+            <a:off x="177160" y="78621"/>
             <a:ext cx="3657600" cy="2011680"/>
           </a:xfrm>
           <a:prstGeom prst="rect">
@@ -3462,7 +3462,7 @@
         </p:blipFill>
         <p:spPr>
           <a:xfrm>
-            <a:off x="98161" y="2060104"/>
+            <a:off x="176746" y="2060104"/>
             <a:ext cx="3657600" cy="2194560"/>
           </a:xfrm>
           <a:prstGeom prst="rect">
@@ -3491,7 +3491,7 @@
         </p:blipFill>
         <p:spPr>
           <a:xfrm>
-            <a:off x="98802" y="4357874"/>
+            <a:off x="177387" y="4357874"/>
             <a:ext cx="3656769" cy="2043589"/>
           </a:xfrm>
           <a:prstGeom prst="rect">
@@ -3513,7 +3513,7 @@
         </p:nvSpPr>
         <p:spPr>
           <a:xfrm>
-            <a:off x="333387" y="149362"/>
+            <a:off x="411972" y="88402"/>
             <a:ext cx="279244" cy="252377"/>
           </a:xfrm>
           <a:prstGeom prst="rect">
@@ -3550,7 +3550,7 @@
         </p:nvSpPr>
         <p:spPr>
           <a:xfrm>
-            <a:off x="326015" y="4358727"/>
+            <a:off x="404600" y="4297767"/>
             <a:ext cx="284052" cy="252377"/>
           </a:xfrm>
           <a:prstGeom prst="rect">
@@ -3587,7 +3587,7 @@
         </p:nvSpPr>
         <p:spPr>
           <a:xfrm rot="16200000">
-            <a:off x="-880270" y="5098225"/>
+            <a:off x="-907269" y="5098225"/>
             <a:ext cx="1987724" cy="215444"/>
           </a:xfrm>
           <a:prstGeom prst="rect">
@@ -3624,8 +3624,8 @@
         </p:nvSpPr>
         <p:spPr>
           <a:xfrm>
-            <a:off x="84564" y="4580468"/>
-            <a:ext cx="328936" cy="215444"/>
+            <a:off x="198101" y="4598074"/>
+            <a:ext cx="292068" cy="184666"/>
           </a:xfrm>
           <a:prstGeom prst="rect">
             <a:avLst/>
@@ -3639,7 +3639,7 @@
           <a:lstStyle/>
           <a:p>
             <a:r>
-              <a:rPr lang="en-US" sz="800" dirty="0">
+              <a:rPr lang="en-US" sz="600" dirty="0">
                 <a:latin typeface="Avenir Medium" panose="02000503020000020003" pitchFamily="2" charset="0"/>
               </a:rPr>
               <a:t>1.0</a:t>
@@ -3661,8 +3661,8 @@
         </p:nvSpPr>
         <p:spPr>
           <a:xfrm>
-            <a:off x="84564" y="5237375"/>
-            <a:ext cx="328936" cy="215444"/>
+            <a:off x="197601" y="5245837"/>
+            <a:ext cx="292068" cy="184666"/>
           </a:xfrm>
           <a:prstGeom prst="rect">
             <a:avLst/>
@@ -3676,7 +3676,7 @@
           <a:lstStyle/>
           <a:p>
             <a:r>
-              <a:rPr lang="en-US" sz="800" dirty="0">
+              <a:rPr lang="en-US" sz="600" dirty="0">
                 <a:latin typeface="Avenir Medium" panose="02000503020000020003" pitchFamily="2" charset="0"/>
               </a:rPr>
               <a:t>0.5</a:t>
@@ -3698,8 +3698,8 @@
         </p:nvSpPr>
         <p:spPr>
           <a:xfrm>
-            <a:off x="165300" y="5893600"/>
-            <a:ext cx="242374" cy="215444"/>
+            <a:off x="243885" y="5905273"/>
+            <a:ext cx="227948" cy="184666"/>
           </a:xfrm>
           <a:prstGeom prst="rect">
             <a:avLst/>
@@ -3713,7 +3713,7 @@
           <a:lstStyle/>
           <a:p>
             <a:r>
-              <a:rPr lang="en-US" sz="800" dirty="0">
+              <a:rPr lang="en-US" sz="600" dirty="0">
                 <a:latin typeface="Avenir Medium" panose="02000503020000020003" pitchFamily="2" charset="0"/>
               </a:rPr>
               <a:t>0</a:t>
@@ -3735,8 +3735,8 @@
         </p:nvSpPr>
         <p:spPr>
           <a:xfrm rot="16200000">
-            <a:off x="-814175" y="870647"/>
-            <a:ext cx="1848583" cy="215444"/>
+            <a:off x="-669836" y="870648"/>
+            <a:ext cx="1508426" cy="215444"/>
           </a:xfrm>
           <a:prstGeom prst="rect">
             <a:avLst/>
@@ -3753,7 +3753,7 @@
               <a:rPr lang="en-US" sz="800" spc="-30" dirty="0">
                 <a:latin typeface="Avenir Medium" panose="02000503020000020003" pitchFamily="2" charset="0"/>
               </a:rPr>
-              <a:t>Wells in wildfire burn areas (thousands)</a:t>
+              <a:t>Wells in wildfire burn areas (n)</a:t>
             </a:r>
           </a:p>
         </p:txBody>
@@ -3772,8 +3772,8 @@
         </p:nvSpPr>
         <p:spPr>
           <a:xfrm rot="16200000">
-            <a:off x="-1011808" y="2889419"/>
-            <a:ext cx="2243884" cy="215444"/>
+            <a:off x="-918442" y="2889420"/>
+            <a:ext cx="2005677" cy="215444"/>
           </a:xfrm>
           <a:prstGeom prst="rect">
             <a:avLst/>
@@ -3790,7 +3790,7 @@
               <a:rPr lang="en-US" sz="800" spc="-30" dirty="0">
                 <a:latin typeface="Avenir Medium" panose="02000503020000020003" pitchFamily="2" charset="0"/>
               </a:rPr>
-              <a:t>Pop. within 1 km of wells  in burn areas (millions)</a:t>
+              <a:t>Pop. within 1 km of wells  in burn areas  (n)</a:t>
             </a:r>
           </a:p>
         </p:txBody>
@@ -3809,8 +3809,8 @@
         </p:nvSpPr>
         <p:spPr>
           <a:xfrm>
-            <a:off x="101400" y="361683"/>
-            <a:ext cx="300082" cy="215444"/>
+            <a:off x="58156" y="361683"/>
+            <a:ext cx="421911" cy="184666"/>
           </a:xfrm>
           <a:prstGeom prst="rect">
             <a:avLst/>
@@ -3825,10 +3825,10 @@
           <a:p>
             <a:pPr algn="r"/>
             <a:r>
-              <a:rPr lang="en-US" sz="800" dirty="0">
+              <a:rPr lang="en-US" sz="600" dirty="0">
                 <a:latin typeface="Avenir Medium" panose="02000503020000020003" pitchFamily="2" charset="0"/>
               </a:rPr>
-              <a:t>15</a:t>
+              <a:t>15,000</a:t>
             </a:r>
           </a:p>
         </p:txBody>
@@ -3847,8 +3847,8 @@
         </p:nvSpPr>
         <p:spPr>
           <a:xfrm>
-            <a:off x="111502" y="762034"/>
-            <a:ext cx="300082" cy="215444"/>
+            <a:off x="68258" y="762034"/>
+            <a:ext cx="421911" cy="184666"/>
           </a:xfrm>
           <a:prstGeom prst="rect">
             <a:avLst/>
@@ -3863,10 +3863,10 @@
           <a:p>
             <a:pPr algn="r"/>
             <a:r>
-              <a:rPr lang="en-US" sz="800" dirty="0">
+              <a:rPr lang="en-US" sz="600" dirty="0">
                 <a:latin typeface="Avenir Medium" panose="02000503020000020003" pitchFamily="2" charset="0"/>
               </a:rPr>
-              <a:t>10</a:t>
+              <a:t>10,000</a:t>
             </a:r>
           </a:p>
         </p:txBody>
@@ -3885,8 +3885,8 @@
         </p:nvSpPr>
         <p:spPr>
           <a:xfrm>
-            <a:off x="154694" y="1567557"/>
-            <a:ext cx="242374" cy="215444"/>
+            <a:off x="247705" y="1567557"/>
+            <a:ext cx="227948" cy="184666"/>
           </a:xfrm>
           <a:prstGeom prst="rect">
             <a:avLst/>
@@ -3901,7 +3901,7 @@
           <a:p>
             <a:pPr algn="r"/>
             <a:r>
-              <a:rPr lang="en-US" sz="800" dirty="0">
+              <a:rPr lang="en-US" sz="600" dirty="0">
                 <a:latin typeface="Avenir Medium" panose="02000503020000020003" pitchFamily="2" charset="0"/>
               </a:rPr>
               <a:t>0</a:t>
@@ -3923,7 +3923,7 @@
         </p:nvSpPr>
         <p:spPr>
           <a:xfrm>
-            <a:off x="1659053" y="6233253"/>
+            <a:off x="1737638" y="6233253"/>
             <a:ext cx="747320" cy="215444"/>
           </a:xfrm>
           <a:prstGeom prst="rect">
@@ -3961,7 +3961,7 @@
         </p:nvSpPr>
         <p:spPr>
           <a:xfrm>
-            <a:off x="1724174" y="3996641"/>
+            <a:off x="1780591" y="4104363"/>
             <a:ext cx="396262" cy="215444"/>
           </a:xfrm>
           <a:prstGeom prst="rect">
@@ -3977,7 +3977,7 @@
           <a:p>
             <a:pPr algn="ctr"/>
             <a:r>
-              <a:rPr lang="en-US" sz="800" dirty="0">
+              <a:rPr lang="en-US" sz="800" b="1" dirty="0">
                 <a:latin typeface="Avenir Medium" panose="02000503020000020003" pitchFamily="2" charset="0"/>
               </a:rPr>
               <a:t>Year</a:t>
@@ -3987,29 +3987,108 @@
       </p:sp>
       <p:sp>
         <p:nvSpPr>
-          <p:cNvPr id="19" name="Rectangle 18">
+          <p:cNvPr id="20" name="TextBox 19">
             <a:extLst>
               <a:ext uri="{FF2B5EF4-FFF2-40B4-BE49-F238E27FC236}">
-                <a16:creationId xmlns:a16="http://schemas.microsoft.com/office/drawing/2014/main" id="{FD8D2394-0CD9-D541-1835-6BD77927CCE0}"/>
+                <a16:creationId xmlns:a16="http://schemas.microsoft.com/office/drawing/2014/main" id="{A1A52FA1-28FB-DC34-8F0D-44D65CD74A83}"/>
               </a:ext>
             </a:extLst>
           </p:cNvPr>
-          <p:cNvSpPr/>
+          <p:cNvSpPr txBox="1"/>
           <p:nvPr/>
         </p:nvSpPr>
         <p:spPr>
           <a:xfrm>
-            <a:off x="481589" y="2168103"/>
-            <a:ext cx="3102248" cy="1613934"/>
+            <a:off x="411972" y="2065948"/>
+            <a:ext cx="268022" cy="252377"/>
+          </a:xfrm>
+          <a:prstGeom prst="rect">
+            <a:avLst/>
+          </a:prstGeom>
+          <a:noFill/>
+        </p:spPr>
+        <p:txBody>
+          <a:bodyPr wrap="none" rtlCol="0">
+            <a:spAutoFit/>
+          </a:bodyPr>
+          <a:lstStyle/>
+          <a:p>
+            <a:r>
+              <a:rPr lang="en-US" sz="1040" dirty="0">
+                <a:latin typeface="Avenir Medium" panose="02000503020000020003" pitchFamily="2" charset="0"/>
+              </a:rPr>
+              <a:t>B</a:t>
+            </a:r>
+          </a:p>
+        </p:txBody>
+      </p:sp>
+      <p:sp>
+        <p:nvSpPr>
+          <p:cNvPr id="21" name="TextBox 20">
+            <a:extLst>
+              <a:ext uri="{FF2B5EF4-FFF2-40B4-BE49-F238E27FC236}">
+                <a16:creationId xmlns:a16="http://schemas.microsoft.com/office/drawing/2014/main" id="{9EE30BBE-69E2-CB79-83AA-38552F72D05C}"/>
+              </a:ext>
+            </a:extLst>
+          </p:cNvPr>
+          <p:cNvSpPr txBox="1"/>
+          <p:nvPr/>
+        </p:nvSpPr>
+        <p:spPr>
+          <a:xfrm>
+            <a:off x="97023" y="1164151"/>
+            <a:ext cx="378630" cy="184666"/>
+          </a:xfrm>
+          <a:prstGeom prst="rect">
+            <a:avLst/>
+          </a:prstGeom>
+          <a:noFill/>
+        </p:spPr>
+        <p:txBody>
+          <a:bodyPr wrap="none" rtlCol="0">
+            <a:spAutoFit/>
+          </a:bodyPr>
+          <a:lstStyle/>
+          <a:p>
+            <a:pPr algn="r"/>
+            <a:r>
+              <a:rPr lang="en-US" sz="600" dirty="0">
+                <a:latin typeface="Avenir Medium" panose="02000503020000020003" pitchFamily="2" charset="0"/>
+              </a:rPr>
+              <a:t>5,000</a:t>
+            </a:r>
+          </a:p>
+        </p:txBody>
+      </p:sp>
+      <p:sp>
+        <p:nvSpPr>
+          <p:cNvPr id="24" name="Rectangle 23">
+            <a:extLst>
+              <a:ext uri="{FF2B5EF4-FFF2-40B4-BE49-F238E27FC236}">
+                <a16:creationId xmlns:a16="http://schemas.microsoft.com/office/drawing/2014/main" id="{33E2DB33-5842-6475-550B-F85AC34640CA}"/>
+              </a:ext>
+            </a:extLst>
+          </p:cNvPr>
+          <p:cNvSpPr>
+            <a:spLocks noChangeAspect="1"/>
+          </p:cNvSpPr>
+          <p:nvPr/>
+        </p:nvSpPr>
+        <p:spPr>
+          <a:xfrm>
+            <a:off x="669770" y="4415111"/>
+            <a:ext cx="137160" cy="137160"/>
           </a:xfrm>
           <a:prstGeom prst="rect">
             <a:avLst/>
           </a:prstGeom>
           <a:solidFill>
-            <a:schemeClr val="bg1"/>
+            <a:srgbClr val="9D7FC7"/>
           </a:solidFill>
           <a:ln>
-            <a:noFill/>
+            <a:solidFill>
+              <a:srgbClr val="000000"/>
+            </a:solidFill>
           </a:ln>
         </p:spPr>
         <p:style>
@@ -4033,16 +4112,16 @@
           <a:lstStyle/>
           <a:p>
             <a:pPr algn="ctr"/>
-            <a:endParaRPr lang="en-US"/>
-          </a:p>
-        </p:txBody>
-      </p:sp>
-      <p:sp>
-        <p:nvSpPr>
-          <p:cNvPr id="20" name="TextBox 19">
+            <a:endParaRPr lang="en-US" dirty="0"/>
+          </a:p>
+        </p:txBody>
+      </p:sp>
+      <p:sp>
+        <p:nvSpPr>
+          <p:cNvPr id="25" name="TextBox 24">
             <a:extLst>
               <a:ext uri="{FF2B5EF4-FFF2-40B4-BE49-F238E27FC236}">
-                <a16:creationId xmlns:a16="http://schemas.microsoft.com/office/drawing/2014/main" id="{A1A52FA1-28FB-DC34-8F0D-44D65CD74A83}"/>
+                <a16:creationId xmlns:a16="http://schemas.microsoft.com/office/drawing/2014/main" id="{65F4FF9D-448F-8FBA-C2E5-C5B22148ED5F}"/>
               </a:ext>
             </a:extLst>
           </p:cNvPr>
@@ -4051,8 +4130,8 @@
         </p:nvSpPr>
         <p:spPr>
           <a:xfrm>
-            <a:off x="333387" y="2126908"/>
-            <a:ext cx="268022" cy="252377"/>
+            <a:off x="750264" y="4379449"/>
+            <a:ext cx="2220761" cy="215444"/>
           </a:xfrm>
           <a:prstGeom prst="rect">
             <a:avLst/>
@@ -4060,26 +4139,27 @@
           <a:noFill/>
         </p:spPr>
         <p:txBody>
-          <a:bodyPr wrap="none" rtlCol="0">
+          <a:bodyPr wrap="square" rtlCol="0">
             <a:spAutoFit/>
           </a:bodyPr>
           <a:lstStyle/>
           <a:p>
             <a:r>
-              <a:rPr lang="en-US" sz="1040" dirty="0">
-                <a:latin typeface="Avenir Medium" panose="02000503020000020003" pitchFamily="2" charset="0"/>
+              <a:rPr lang="en-US" sz="800" spc="-30" dirty="0">
+                <a:latin typeface="Avenir Book" panose="02000503020000020003" pitchFamily="2" charset="0"/>
+                <a:cs typeface="Arial" panose="020B0604020202020204" pitchFamily="34" charset="0"/>
               </a:rPr>
-              <a:t>B</a:t>
-            </a:r>
-          </a:p>
-        </p:txBody>
-      </p:sp>
-      <p:sp>
-        <p:nvSpPr>
-          <p:cNvPr id="21" name="TextBox 20">
+              <a:t>Moderately high wildfire risk (KBDI ≥ 450)</a:t>
+            </a:r>
+          </a:p>
+        </p:txBody>
+      </p:sp>
+      <p:sp>
+        <p:nvSpPr>
+          <p:cNvPr id="26" name="TextBox 25">
             <a:extLst>
               <a:ext uri="{FF2B5EF4-FFF2-40B4-BE49-F238E27FC236}">
-                <a16:creationId xmlns:a16="http://schemas.microsoft.com/office/drawing/2014/main" id="{9EE30BBE-69E2-CB79-83AA-38552F72D05C}"/>
+                <a16:creationId xmlns:a16="http://schemas.microsoft.com/office/drawing/2014/main" id="{855A6525-0F04-EB3E-212E-10192617A3A7}"/>
               </a:ext>
             </a:extLst>
           </p:cNvPr>
@@ -4088,8 +4168,8 @@
         </p:nvSpPr>
         <p:spPr>
           <a:xfrm>
-            <a:off x="154694" y="1164151"/>
-            <a:ext cx="242374" cy="215444"/>
+            <a:off x="750264" y="4578792"/>
+            <a:ext cx="1811328" cy="215444"/>
           </a:xfrm>
           <a:prstGeom prst="rect">
             <a:avLst/>
@@ -4097,27 +4177,27 @@
           <a:noFill/>
         </p:spPr>
         <p:txBody>
-          <a:bodyPr wrap="none" rtlCol="0">
+          <a:bodyPr wrap="square">
             <a:spAutoFit/>
           </a:bodyPr>
           <a:lstStyle/>
           <a:p>
-            <a:pPr algn="r"/>
-            <a:r>
-              <a:rPr lang="en-US" sz="800" dirty="0">
-                <a:latin typeface="Avenir Medium" panose="02000503020000020003" pitchFamily="2" charset="0"/>
+            <a:r>
+              <a:rPr lang="en-US" sz="800" spc="-30" dirty="0">
+                <a:latin typeface="Avenir Book" panose="02000503020000020003" pitchFamily="2" charset="0"/>
+                <a:cs typeface="Arial" panose="020B0604020202020204" pitchFamily="34" charset="0"/>
               </a:rPr>
-              <a:t>5</a:t>
-            </a:r>
-          </a:p>
-        </p:txBody>
-      </p:sp>
-      <p:sp>
-        <p:nvSpPr>
-          <p:cNvPr id="24" name="Rectangle 23">
+              <a:t>High wildfire risk (KBDI ≥ 600)</a:t>
+            </a:r>
+          </a:p>
+        </p:txBody>
+      </p:sp>
+      <p:sp>
+        <p:nvSpPr>
+          <p:cNvPr id="27" name="Rectangle 26">
             <a:extLst>
               <a:ext uri="{FF2B5EF4-FFF2-40B4-BE49-F238E27FC236}">
-                <a16:creationId xmlns:a16="http://schemas.microsoft.com/office/drawing/2014/main" id="{33E2DB33-5842-6475-550B-F85AC34640CA}"/>
+                <a16:creationId xmlns:a16="http://schemas.microsoft.com/office/drawing/2014/main" id="{DE0F7C02-C6EC-98A0-F0E3-6882CCA1D688}"/>
               </a:ext>
             </a:extLst>
           </p:cNvPr>
@@ -4128,14 +4208,14 @@
         </p:nvSpPr>
         <p:spPr>
           <a:xfrm>
-            <a:off x="591185" y="4415111"/>
-            <a:ext cx="137160" cy="137160"/>
+            <a:off x="669770" y="4613652"/>
+            <a:ext cx="137160" cy="136627"/>
           </a:xfrm>
           <a:prstGeom prst="rect">
             <a:avLst/>
           </a:prstGeom>
           <a:solidFill>
-            <a:srgbClr val="9D7FC7"/>
+            <a:srgbClr val="FFB3DF"/>
           </a:solidFill>
           <a:ln>
             <a:solidFill>
@@ -4170,108 +4250,32 @@
       </p:sp>
       <p:sp>
         <p:nvSpPr>
-          <p:cNvPr id="25" name="TextBox 24">
+          <p:cNvPr id="28" name="Rectangle 27">
             <a:extLst>
               <a:ext uri="{FF2B5EF4-FFF2-40B4-BE49-F238E27FC236}">
-                <a16:creationId xmlns:a16="http://schemas.microsoft.com/office/drawing/2014/main" id="{65F4FF9D-448F-8FBA-C2E5-C5B22148ED5F}"/>
+                <a16:creationId xmlns:a16="http://schemas.microsoft.com/office/drawing/2014/main" id="{A2C0DD85-9312-18CC-B81F-270B4D325BEB}"/>
               </a:ext>
             </a:extLst>
           </p:cNvPr>
-          <p:cNvSpPr txBox="1"/>
+          <p:cNvSpPr>
+            <a:spLocks noChangeAspect="1"/>
+          </p:cNvSpPr>
           <p:nvPr/>
         </p:nvSpPr>
         <p:spPr>
           <a:xfrm>
-            <a:off x="671679" y="4379449"/>
-            <a:ext cx="2220761" cy="215444"/>
-          </a:xfrm>
-          <a:prstGeom prst="rect">
-            <a:avLst/>
-          </a:prstGeom>
-          <a:noFill/>
-        </p:spPr>
-        <p:txBody>
-          <a:bodyPr wrap="square" rtlCol="0">
-            <a:spAutoFit/>
-          </a:bodyPr>
-          <a:lstStyle/>
-          <a:p>
-            <a:r>
-              <a:rPr lang="en-US" sz="800" spc="-30" dirty="0">
-                <a:latin typeface="Avenir Book" panose="02000503020000020003" pitchFamily="2" charset="0"/>
-                <a:cs typeface="Arial" panose="020B0604020202020204" pitchFamily="34" charset="0"/>
-              </a:rPr>
-              <a:t>Moderately high wildfire risk (KBDI ≥ 450)</a:t>
-            </a:r>
-          </a:p>
-        </p:txBody>
-      </p:sp>
-      <p:sp>
-        <p:nvSpPr>
-          <p:cNvPr id="26" name="TextBox 25">
-            <a:extLst>
-              <a:ext uri="{FF2B5EF4-FFF2-40B4-BE49-F238E27FC236}">
-                <a16:creationId xmlns:a16="http://schemas.microsoft.com/office/drawing/2014/main" id="{855A6525-0F04-EB3E-212E-10192617A3A7}"/>
-              </a:ext>
-            </a:extLst>
-          </p:cNvPr>
-          <p:cNvSpPr txBox="1"/>
-          <p:nvPr/>
-        </p:nvSpPr>
-        <p:spPr>
-          <a:xfrm>
-            <a:off x="671679" y="4578792"/>
-            <a:ext cx="1811328" cy="215444"/>
-          </a:xfrm>
-          <a:prstGeom prst="rect">
-            <a:avLst/>
-          </a:prstGeom>
-          <a:noFill/>
-        </p:spPr>
-        <p:txBody>
-          <a:bodyPr wrap="square">
-            <a:spAutoFit/>
-          </a:bodyPr>
-          <a:lstStyle/>
-          <a:p>
-            <a:r>
-              <a:rPr lang="en-US" sz="800" spc="-30" dirty="0">
-                <a:latin typeface="Avenir Book" panose="02000503020000020003" pitchFamily="2" charset="0"/>
-                <a:cs typeface="Arial" panose="020B0604020202020204" pitchFamily="34" charset="0"/>
-              </a:rPr>
-              <a:t>High wildfire risk (KBDI ≥ 600)</a:t>
-            </a:r>
-          </a:p>
-        </p:txBody>
-      </p:sp>
-      <p:sp>
-        <p:nvSpPr>
-          <p:cNvPr id="27" name="Rectangle 26">
-            <a:extLst>
-              <a:ext uri="{FF2B5EF4-FFF2-40B4-BE49-F238E27FC236}">
-                <a16:creationId xmlns:a16="http://schemas.microsoft.com/office/drawing/2014/main" id="{DE0F7C02-C6EC-98A0-F0E3-6882CCA1D688}"/>
-              </a:ext>
-            </a:extLst>
-          </p:cNvPr>
-          <p:cNvSpPr>
-            <a:spLocks noChangeAspect="1"/>
-          </p:cNvSpPr>
-          <p:nvPr/>
-        </p:nvSpPr>
-        <p:spPr>
-          <a:xfrm>
-            <a:off x="591185" y="4613652"/>
-            <a:ext cx="137160" cy="136627"/>
+            <a:off x="3657875" y="3939392"/>
+            <a:ext cx="176746" cy="133399"/>
           </a:xfrm>
           <a:prstGeom prst="rect">
             <a:avLst/>
           </a:prstGeom>
           <a:solidFill>
-            <a:srgbClr val="FFB3DF"/>
+            <a:schemeClr val="bg1"/>
           </a:solidFill>
           <a:ln>
             <a:solidFill>
-              <a:srgbClr val="000000"/>
+              <a:schemeClr val="bg1"/>
             </a:solidFill>
           </a:ln>
         </p:spPr>
@@ -4302,62 +4306,6 @@
       </p:sp>
       <p:sp>
         <p:nvSpPr>
-          <p:cNvPr id="28" name="Rectangle 27">
-            <a:extLst>
-              <a:ext uri="{FF2B5EF4-FFF2-40B4-BE49-F238E27FC236}">
-                <a16:creationId xmlns:a16="http://schemas.microsoft.com/office/drawing/2014/main" id="{A2C0DD85-9312-18CC-B81F-270B4D325BEB}"/>
-              </a:ext>
-            </a:extLst>
-          </p:cNvPr>
-          <p:cNvSpPr>
-            <a:spLocks noChangeAspect="1"/>
-          </p:cNvSpPr>
-          <p:nvPr/>
-        </p:nvSpPr>
-        <p:spPr>
-          <a:xfrm>
-            <a:off x="3429230" y="3900242"/>
-            <a:ext cx="332348" cy="133399"/>
-          </a:xfrm>
-          <a:prstGeom prst="rect">
-            <a:avLst/>
-          </a:prstGeom>
-          <a:solidFill>
-            <a:schemeClr val="bg1"/>
-          </a:solidFill>
-          <a:ln>
-            <a:solidFill>
-              <a:schemeClr val="bg1"/>
-            </a:solidFill>
-          </a:ln>
-        </p:spPr>
-        <p:style>
-          <a:lnRef idx="2">
-            <a:schemeClr val="accent1">
-              <a:shade val="50000"/>
-            </a:schemeClr>
-          </a:lnRef>
-          <a:fillRef idx="1">
-            <a:schemeClr val="accent1"/>
-          </a:fillRef>
-          <a:effectRef idx="0">
-            <a:schemeClr val="accent1"/>
-          </a:effectRef>
-          <a:fontRef idx="minor">
-            <a:schemeClr val="lt1"/>
-          </a:fontRef>
-        </p:style>
-        <p:txBody>
-          <a:bodyPr rtlCol="0" anchor="ctr"/>
-          <a:lstStyle/>
-          <a:p>
-            <a:pPr algn="ctr"/>
-            <a:endParaRPr lang="en-US" dirty="0"/>
-          </a:p>
-        </p:txBody>
-      </p:sp>
-      <p:sp>
-        <p:nvSpPr>
           <p:cNvPr id="29" name="TextBox 28">
             <a:extLst>
               <a:ext uri="{FF2B5EF4-FFF2-40B4-BE49-F238E27FC236}">
@@ -4370,8 +4318,8 @@
         </p:nvSpPr>
         <p:spPr>
           <a:xfrm>
-            <a:off x="107592" y="2272896"/>
-            <a:ext cx="300082" cy="215444"/>
+            <a:off x="64349" y="2163333"/>
+            <a:ext cx="421910" cy="184666"/>
           </a:xfrm>
           <a:prstGeom prst="rect">
             <a:avLst/>
@@ -4386,48 +4334,10 @@
           <a:p>
             <a:pPr algn="r"/>
             <a:r>
-              <a:rPr lang="en-US" sz="800" dirty="0">
+              <a:rPr lang="en-US" sz="600" dirty="0">
                 <a:latin typeface="Avenir Medium" panose="02000503020000020003" pitchFamily="2" charset="0"/>
               </a:rPr>
-              <a:t>15</a:t>
-            </a:r>
-          </a:p>
-        </p:txBody>
-      </p:sp>
-      <p:sp>
-        <p:nvSpPr>
-          <p:cNvPr id="30" name="TextBox 29">
-            <a:extLst>
-              <a:ext uri="{FF2B5EF4-FFF2-40B4-BE49-F238E27FC236}">
-                <a16:creationId xmlns:a16="http://schemas.microsoft.com/office/drawing/2014/main" id="{E3A02582-31E1-0FC3-82BC-D630B63EA4DA}"/>
-              </a:ext>
-            </a:extLst>
-          </p:cNvPr>
-          <p:cNvSpPr txBox="1"/>
-          <p:nvPr/>
-        </p:nvSpPr>
-        <p:spPr>
-          <a:xfrm>
-            <a:off x="117694" y="2973575"/>
-            <a:ext cx="300082" cy="215444"/>
-          </a:xfrm>
-          <a:prstGeom prst="rect">
-            <a:avLst/>
-          </a:prstGeom>
-          <a:noFill/>
-        </p:spPr>
-        <p:txBody>
-          <a:bodyPr wrap="none" rtlCol="0">
-            <a:spAutoFit/>
-          </a:bodyPr>
-          <a:lstStyle/>
-          <a:p>
-            <a:pPr algn="r"/>
-            <a:r>
-              <a:rPr lang="en-US" sz="800" dirty="0">
-                <a:latin typeface="Avenir Medium" panose="02000503020000020003" pitchFamily="2" charset="0"/>
-              </a:rPr>
-              <a:t>10</a:t>
+              <a:t>50,000</a:t>
             </a:r>
           </a:p>
         </p:txBody>
@@ -4446,8 +4356,8 @@
         </p:nvSpPr>
         <p:spPr>
           <a:xfrm>
-            <a:off x="160886" y="3663865"/>
-            <a:ext cx="242374" cy="215444"/>
+            <a:off x="257788" y="3810782"/>
+            <a:ext cx="227948" cy="184666"/>
           </a:xfrm>
           <a:prstGeom prst="rect">
             <a:avLst/>
@@ -4462,7 +4372,7 @@
           <a:p>
             <a:pPr algn="r"/>
             <a:r>
-              <a:rPr lang="en-US" sz="800" dirty="0">
+              <a:rPr lang="en-US" sz="600" dirty="0">
                 <a:latin typeface="Avenir Medium" panose="02000503020000020003" pitchFamily="2" charset="0"/>
               </a:rPr>
               <a:t>0</a:t>
@@ -4472,10 +4382,10 @@
       </p:sp>
       <p:sp>
         <p:nvSpPr>
-          <p:cNvPr id="32" name="TextBox 31">
+          <p:cNvPr id="11" name="TextBox 10">
             <a:extLst>
               <a:ext uri="{FF2B5EF4-FFF2-40B4-BE49-F238E27FC236}">
-                <a16:creationId xmlns:a16="http://schemas.microsoft.com/office/drawing/2014/main" id="{ADA8AA52-A567-D316-0114-150F2F132AFF}"/>
+                <a16:creationId xmlns:a16="http://schemas.microsoft.com/office/drawing/2014/main" id="{773B9E4D-6251-5DA0-AA66-CFBE41B2EE91}"/>
               </a:ext>
             </a:extLst>
           </p:cNvPr>
@@ -4484,8 +4394,8 @@
         </p:nvSpPr>
         <p:spPr>
           <a:xfrm>
-            <a:off x="160886" y="3324247"/>
-            <a:ext cx="242374" cy="215444"/>
+            <a:off x="68257" y="2494458"/>
+            <a:ext cx="421911" cy="184666"/>
           </a:xfrm>
           <a:prstGeom prst="rect">
             <a:avLst/>
@@ -4500,10 +4410,395 @@
           <a:p>
             <a:pPr algn="r"/>
             <a:r>
+              <a:rPr lang="en-US" sz="600" dirty="0">
+                <a:latin typeface="Avenir Medium" panose="02000503020000020003" pitchFamily="2" charset="0"/>
+              </a:rPr>
+              <a:t>40,000</a:t>
+            </a:r>
+          </a:p>
+        </p:txBody>
+      </p:sp>
+      <p:sp>
+        <p:nvSpPr>
+          <p:cNvPr id="22" name="TextBox 21">
+            <a:extLst>
+              <a:ext uri="{FF2B5EF4-FFF2-40B4-BE49-F238E27FC236}">
+                <a16:creationId xmlns:a16="http://schemas.microsoft.com/office/drawing/2014/main" id="{6907C744-1195-F1B1-9D5A-AF28CDB24878}"/>
+              </a:ext>
+            </a:extLst>
+          </p:cNvPr>
+          <p:cNvSpPr txBox="1"/>
+          <p:nvPr/>
+        </p:nvSpPr>
+        <p:spPr>
+          <a:xfrm>
+            <a:off x="67759" y="2820041"/>
+            <a:ext cx="421910" cy="184666"/>
+          </a:xfrm>
+          <a:prstGeom prst="rect">
+            <a:avLst/>
+          </a:prstGeom>
+          <a:noFill/>
+        </p:spPr>
+        <p:txBody>
+          <a:bodyPr wrap="none" rtlCol="0">
+            <a:spAutoFit/>
+          </a:bodyPr>
+          <a:lstStyle/>
+          <a:p>
+            <a:pPr algn="r"/>
+            <a:r>
+              <a:rPr lang="en-US" sz="600" dirty="0">
+                <a:latin typeface="Avenir Medium" panose="02000503020000020003" pitchFamily="2" charset="0"/>
+              </a:rPr>
+              <a:t>30,000</a:t>
+            </a:r>
+          </a:p>
+        </p:txBody>
+      </p:sp>
+      <p:sp>
+        <p:nvSpPr>
+          <p:cNvPr id="23" name="TextBox 22">
+            <a:extLst>
+              <a:ext uri="{FF2B5EF4-FFF2-40B4-BE49-F238E27FC236}">
+                <a16:creationId xmlns:a16="http://schemas.microsoft.com/office/drawing/2014/main" id="{8294ED2B-5E3F-C162-FF1A-EAAB3B262A1F}"/>
+              </a:ext>
+            </a:extLst>
+          </p:cNvPr>
+          <p:cNvSpPr txBox="1"/>
+          <p:nvPr/>
+        </p:nvSpPr>
+        <p:spPr>
+          <a:xfrm>
+            <a:off x="66691" y="3145112"/>
+            <a:ext cx="421911" cy="184666"/>
+          </a:xfrm>
+          <a:prstGeom prst="rect">
+            <a:avLst/>
+          </a:prstGeom>
+          <a:noFill/>
+        </p:spPr>
+        <p:txBody>
+          <a:bodyPr wrap="none" rtlCol="0">
+            <a:spAutoFit/>
+          </a:bodyPr>
+          <a:lstStyle/>
+          <a:p>
+            <a:pPr algn="r"/>
+            <a:r>
+              <a:rPr lang="en-US" sz="600" dirty="0">
+                <a:latin typeface="Avenir Medium" panose="02000503020000020003" pitchFamily="2" charset="0"/>
+              </a:rPr>
+              <a:t>20,000</a:t>
+            </a:r>
+          </a:p>
+        </p:txBody>
+      </p:sp>
+      <p:sp>
+        <p:nvSpPr>
+          <p:cNvPr id="33" name="TextBox 32">
+            <a:extLst>
+              <a:ext uri="{FF2B5EF4-FFF2-40B4-BE49-F238E27FC236}">
+                <a16:creationId xmlns:a16="http://schemas.microsoft.com/office/drawing/2014/main" id="{96134DA5-79C9-A183-932B-1110A6D45AC9}"/>
+              </a:ext>
+            </a:extLst>
+          </p:cNvPr>
+          <p:cNvSpPr txBox="1"/>
+          <p:nvPr/>
+        </p:nvSpPr>
+        <p:spPr>
+          <a:xfrm>
+            <a:off x="66692" y="3481219"/>
+            <a:ext cx="421910" cy="184666"/>
+          </a:xfrm>
+          <a:prstGeom prst="rect">
+            <a:avLst/>
+          </a:prstGeom>
+          <a:noFill/>
+        </p:spPr>
+        <p:txBody>
+          <a:bodyPr wrap="none" rtlCol="0">
+            <a:spAutoFit/>
+          </a:bodyPr>
+          <a:lstStyle/>
+          <a:p>
+            <a:pPr algn="r"/>
+            <a:r>
+              <a:rPr lang="en-US" sz="600" dirty="0">
+                <a:latin typeface="Avenir Medium" panose="02000503020000020003" pitchFamily="2" charset="0"/>
+              </a:rPr>
+              <a:t>10,000</a:t>
+            </a:r>
+          </a:p>
+        </p:txBody>
+      </p:sp>
+      <p:grpSp>
+        <p:nvGrpSpPr>
+          <p:cNvPr id="42" name="Group 41">
+            <a:extLst>
+              <a:ext uri="{FF2B5EF4-FFF2-40B4-BE49-F238E27FC236}">
+                <a16:creationId xmlns:a16="http://schemas.microsoft.com/office/drawing/2014/main" id="{E879EEBD-8B15-ACDD-85F9-27CCCFB89E38}"/>
+              </a:ext>
+            </a:extLst>
+          </p:cNvPr>
+          <p:cNvGrpSpPr/>
+          <p:nvPr/>
+        </p:nvGrpSpPr>
+        <p:grpSpPr>
+          <a:xfrm>
+            <a:off x="924946" y="157830"/>
+            <a:ext cx="805445" cy="184666"/>
+            <a:chOff x="594657" y="387499"/>
+            <a:chExt cx="805445" cy="184666"/>
+          </a:xfrm>
+        </p:grpSpPr>
+        <p:sp>
+          <p:nvSpPr>
+            <p:cNvPr id="34" name="TextBox 33">
+              <a:extLst>
+                <a:ext uri="{FF2B5EF4-FFF2-40B4-BE49-F238E27FC236}">
+                  <a16:creationId xmlns:a16="http://schemas.microsoft.com/office/drawing/2014/main" id="{53AF0BC8-39CD-2CE2-8C65-5F7E0D659FB6}"/>
+                </a:ext>
+              </a:extLst>
+            </p:cNvPr>
+            <p:cNvSpPr txBox="1"/>
+            <p:nvPr/>
+          </p:nvSpPr>
+          <p:spPr>
+            <a:xfrm>
+              <a:off x="821097" y="387499"/>
+              <a:ext cx="579005" cy="184666"/>
+            </a:xfrm>
+            <a:prstGeom prst="rect">
+              <a:avLst/>
+            </a:prstGeom>
+            <a:noFill/>
+          </p:spPr>
+          <p:txBody>
+            <a:bodyPr wrap="none" rtlCol="0">
+              <a:spAutoFit/>
+            </a:bodyPr>
+            <a:lstStyle/>
+            <a:p>
+              <a:r>
+                <a:rPr lang="en-US" sz="600" dirty="0">
+                  <a:latin typeface="Avenir Medium" panose="02000503020000020003" pitchFamily="2" charset="0"/>
+                </a:rPr>
+                <a:t>Best fit line</a:t>
+              </a:r>
+            </a:p>
+          </p:txBody>
+        </p:sp>
+        <p:sp>
+          <p:nvSpPr>
+            <p:cNvPr id="35" name="Rectangle 34">
+              <a:extLst>
+                <a:ext uri="{FF2B5EF4-FFF2-40B4-BE49-F238E27FC236}">
+                  <a16:creationId xmlns:a16="http://schemas.microsoft.com/office/drawing/2014/main" id="{DF854779-8904-6DAB-BB37-FB76CD96B0FB}"/>
+                </a:ext>
+              </a:extLst>
+            </p:cNvPr>
+            <p:cNvSpPr/>
+            <p:nvPr/>
+          </p:nvSpPr>
+          <p:spPr>
+            <a:xfrm>
+              <a:off x="594657" y="427287"/>
+              <a:ext cx="279244" cy="95658"/>
+            </a:xfrm>
+            <a:prstGeom prst="rect">
+              <a:avLst/>
+            </a:prstGeom>
+            <a:solidFill>
+              <a:srgbClr val="E2E2E2"/>
+            </a:solidFill>
+            <a:ln>
+              <a:noFill/>
+            </a:ln>
+          </p:spPr>
+          <p:style>
+            <a:lnRef idx="2">
+              <a:schemeClr val="accent1">
+                <a:shade val="50000"/>
+              </a:schemeClr>
+            </a:lnRef>
+            <a:fillRef idx="1">
+              <a:schemeClr val="accent1"/>
+            </a:fillRef>
+            <a:effectRef idx="0">
+              <a:schemeClr val="accent1"/>
+            </a:effectRef>
+            <a:fontRef idx="minor">
+              <a:schemeClr val="lt1"/>
+            </a:fontRef>
+          </p:style>
+          <p:txBody>
+            <a:bodyPr rtlCol="0" anchor="ctr"/>
+            <a:lstStyle/>
+            <a:p>
+              <a:pPr algn="ctr"/>
+              <a:endParaRPr lang="en-US"/>
+            </a:p>
+          </p:txBody>
+        </p:sp>
+        <p:cxnSp>
+          <p:nvCxnSpPr>
+            <p:cNvPr id="37" name="Straight Connector 36">
+              <a:extLst>
+                <a:ext uri="{FF2B5EF4-FFF2-40B4-BE49-F238E27FC236}">
+                  <a16:creationId xmlns:a16="http://schemas.microsoft.com/office/drawing/2014/main" id="{AC750879-B99C-4F6A-FB56-17AEB5F04A60}"/>
+                </a:ext>
+              </a:extLst>
+            </p:cNvPr>
+            <p:cNvCxnSpPr>
+              <a:cxnSpLocks/>
+            </p:cNvCxnSpPr>
+            <p:nvPr/>
+          </p:nvCxnSpPr>
+          <p:spPr>
+            <a:xfrm>
+              <a:off x="594657" y="472480"/>
+              <a:ext cx="279244" cy="0"/>
+            </a:xfrm>
+            <a:prstGeom prst="line">
+              <a:avLst/>
+            </a:prstGeom>
+            <a:ln>
+              <a:solidFill>
+                <a:schemeClr val="tx1">
+                  <a:lumMod val="95000"/>
+                  <a:lumOff val="5000"/>
+                </a:schemeClr>
+              </a:solidFill>
+              <a:prstDash val="lgDash"/>
+            </a:ln>
+          </p:spPr>
+          <p:style>
+            <a:lnRef idx="1">
+              <a:schemeClr val="accent1"/>
+            </a:lnRef>
+            <a:fillRef idx="0">
+              <a:schemeClr val="accent1"/>
+            </a:fillRef>
+            <a:effectRef idx="0">
+              <a:schemeClr val="accent1"/>
+            </a:effectRef>
+            <a:fontRef idx="minor">
+              <a:schemeClr val="tx1"/>
+            </a:fontRef>
+          </p:style>
+        </p:cxnSp>
+      </p:grpSp>
+      <p:sp>
+        <p:nvSpPr>
+          <p:cNvPr id="19" name="TextBox 18">
+            <a:extLst>
+              <a:ext uri="{FF2B5EF4-FFF2-40B4-BE49-F238E27FC236}">
+                <a16:creationId xmlns:a16="http://schemas.microsoft.com/office/drawing/2014/main" id="{B67577F5-C9E5-923E-D92C-B360D566EDE3}"/>
+              </a:ext>
+            </a:extLst>
+          </p:cNvPr>
+          <p:cNvSpPr txBox="1"/>
+          <p:nvPr/>
+        </p:nvSpPr>
+        <p:spPr>
+          <a:xfrm>
+            <a:off x="927626" y="3967434"/>
+            <a:ext cx="415499" cy="215444"/>
+          </a:xfrm>
+          <a:prstGeom prst="rect">
+            <a:avLst/>
+          </a:prstGeom>
+          <a:noFill/>
+        </p:spPr>
+        <p:txBody>
+          <a:bodyPr wrap="none" rtlCol="0">
+            <a:spAutoFit/>
+          </a:bodyPr>
+          <a:lstStyle/>
+          <a:p>
+            <a:pPr algn="ctr"/>
+            <a:r>
               <a:rPr lang="en-US" sz="800" dirty="0">
                 <a:latin typeface="Avenir Medium" panose="02000503020000020003" pitchFamily="2" charset="0"/>
               </a:rPr>
-              <a:t>5</a:t>
+              <a:t>1990</a:t>
+            </a:r>
+          </a:p>
+        </p:txBody>
+      </p:sp>
+      <p:sp>
+        <p:nvSpPr>
+          <p:cNvPr id="30" name="TextBox 29">
+            <a:extLst>
+              <a:ext uri="{FF2B5EF4-FFF2-40B4-BE49-F238E27FC236}">
+                <a16:creationId xmlns:a16="http://schemas.microsoft.com/office/drawing/2014/main" id="{E79DD8C0-CEA6-9516-E396-30309C3EC1E8}"/>
+              </a:ext>
+            </a:extLst>
+          </p:cNvPr>
+          <p:cNvSpPr txBox="1"/>
+          <p:nvPr/>
+        </p:nvSpPr>
+        <p:spPr>
+          <a:xfrm>
+            <a:off x="1765734" y="3968400"/>
+            <a:ext cx="415499" cy="215444"/>
+          </a:xfrm>
+          <a:prstGeom prst="rect">
+            <a:avLst/>
+          </a:prstGeom>
+          <a:noFill/>
+        </p:spPr>
+        <p:txBody>
+          <a:bodyPr wrap="none" rtlCol="0">
+            <a:spAutoFit/>
+          </a:bodyPr>
+          <a:lstStyle/>
+          <a:p>
+            <a:pPr algn="ctr"/>
+            <a:r>
+              <a:rPr lang="en-US" sz="800" dirty="0">
+                <a:latin typeface="Avenir Medium" panose="02000503020000020003" pitchFamily="2" charset="0"/>
+              </a:rPr>
+              <a:t>2000</a:t>
+            </a:r>
+          </a:p>
+        </p:txBody>
+      </p:sp>
+      <p:sp>
+        <p:nvSpPr>
+          <p:cNvPr id="32" name="TextBox 31">
+            <a:extLst>
+              <a:ext uri="{FF2B5EF4-FFF2-40B4-BE49-F238E27FC236}">
+                <a16:creationId xmlns:a16="http://schemas.microsoft.com/office/drawing/2014/main" id="{CBD9BD5F-A657-52A0-A742-573031E56F92}"/>
+              </a:ext>
+            </a:extLst>
+          </p:cNvPr>
+          <p:cNvSpPr txBox="1"/>
+          <p:nvPr/>
+        </p:nvSpPr>
+        <p:spPr>
+          <a:xfrm>
+            <a:off x="2612466" y="3964070"/>
+            <a:ext cx="415499" cy="215444"/>
+          </a:xfrm>
+          <a:prstGeom prst="rect">
+            <a:avLst/>
+          </a:prstGeom>
+          <a:noFill/>
+        </p:spPr>
+        <p:txBody>
+          <a:bodyPr wrap="none" rtlCol="0">
+            <a:spAutoFit/>
+          </a:bodyPr>
+          <a:lstStyle/>
+          <a:p>
+            <a:pPr algn="ctr"/>
+            <a:r>
+              <a:rPr lang="en-US" sz="800" dirty="0">
+                <a:latin typeface="Avenir Medium" panose="02000503020000020003" pitchFamily="2" charset="0"/>
+              </a:rPr>
+              <a:t>2010</a:t>
             </a:r>
           </a:p>
         </p:txBody>

</xml_diff>

<commit_message>
Adjusting figures and results scripts
</commit_message>
<xml_diff>
--- a/output/figures/components/figure_3.pptx
+++ b/output/figures/components/figure_3.pptx
@@ -197,7 +197,7 @@
           <a:p>
             <a:fld id="{A16B860A-9A1A-144A-96A5-5B32CEA06BBF}" type="datetimeFigureOut">
               <a:rPr lang="en-US" smtClean="0"/>
-              <a:t>3/22/23</a:t>
+              <a:t>3/29/23</a:t>
             </a:fld>
             <a:endParaRPr lang="en-US"/>
           </a:p>
@@ -684,7 +684,7 @@
           <a:p>
             <a:fld id="{E053DD94-EF7D-4B46-90DA-1D86C84E35B6}" type="datetimeFigureOut">
               <a:rPr lang="en-US" smtClean="0"/>
-              <a:t>3/22/23</a:t>
+              <a:t>3/29/23</a:t>
             </a:fld>
             <a:endParaRPr lang="en-US"/>
           </a:p>
@@ -854,7 +854,7 @@
           <a:p>
             <a:fld id="{E053DD94-EF7D-4B46-90DA-1D86C84E35B6}" type="datetimeFigureOut">
               <a:rPr lang="en-US" smtClean="0"/>
-              <a:t>3/22/23</a:t>
+              <a:t>3/29/23</a:t>
             </a:fld>
             <a:endParaRPr lang="en-US"/>
           </a:p>
@@ -1034,7 +1034,7 @@
           <a:p>
             <a:fld id="{E053DD94-EF7D-4B46-90DA-1D86C84E35B6}" type="datetimeFigureOut">
               <a:rPr lang="en-US" smtClean="0"/>
-              <a:t>3/22/23</a:t>
+              <a:t>3/29/23</a:t>
             </a:fld>
             <a:endParaRPr lang="en-US"/>
           </a:p>
@@ -1204,7 +1204,7 @@
           <a:p>
             <a:fld id="{E053DD94-EF7D-4B46-90DA-1D86C84E35B6}" type="datetimeFigureOut">
               <a:rPr lang="en-US" smtClean="0"/>
-              <a:t>3/22/23</a:t>
+              <a:t>3/29/23</a:t>
             </a:fld>
             <a:endParaRPr lang="en-US"/>
           </a:p>
@@ -1448,7 +1448,7 @@
           <a:p>
             <a:fld id="{E053DD94-EF7D-4B46-90DA-1D86C84E35B6}" type="datetimeFigureOut">
               <a:rPr lang="en-US" smtClean="0"/>
-              <a:t>3/22/23</a:t>
+              <a:t>3/29/23</a:t>
             </a:fld>
             <a:endParaRPr lang="en-US"/>
           </a:p>
@@ -1680,7 +1680,7 @@
           <a:p>
             <a:fld id="{E053DD94-EF7D-4B46-90DA-1D86C84E35B6}" type="datetimeFigureOut">
               <a:rPr lang="en-US" smtClean="0"/>
-              <a:t>3/22/23</a:t>
+              <a:t>3/29/23</a:t>
             </a:fld>
             <a:endParaRPr lang="en-US"/>
           </a:p>
@@ -2047,7 +2047,7 @@
           <a:p>
             <a:fld id="{E053DD94-EF7D-4B46-90DA-1D86C84E35B6}" type="datetimeFigureOut">
               <a:rPr lang="en-US" smtClean="0"/>
-              <a:t>3/22/23</a:t>
+              <a:t>3/29/23</a:t>
             </a:fld>
             <a:endParaRPr lang="en-US"/>
           </a:p>
@@ -2165,7 +2165,7 @@
           <a:p>
             <a:fld id="{E053DD94-EF7D-4B46-90DA-1D86C84E35B6}" type="datetimeFigureOut">
               <a:rPr lang="en-US" smtClean="0"/>
-              <a:t>3/22/23</a:t>
+              <a:t>3/29/23</a:t>
             </a:fld>
             <a:endParaRPr lang="en-US"/>
           </a:p>
@@ -2260,7 +2260,7 @@
           <a:p>
             <a:fld id="{E053DD94-EF7D-4B46-90DA-1D86C84E35B6}" type="datetimeFigureOut">
               <a:rPr lang="en-US" smtClean="0"/>
-              <a:t>3/22/23</a:t>
+              <a:t>3/29/23</a:t>
             </a:fld>
             <a:endParaRPr lang="en-US"/>
           </a:p>
@@ -2537,7 +2537,7 @@
           <a:p>
             <a:fld id="{E053DD94-EF7D-4B46-90DA-1D86C84E35B6}" type="datetimeFigureOut">
               <a:rPr lang="en-US" smtClean="0"/>
-              <a:t>3/22/23</a:t>
+              <a:t>3/29/23</a:t>
             </a:fld>
             <a:endParaRPr lang="en-US"/>
           </a:p>
@@ -2794,7 +2794,7 @@
           <a:p>
             <a:fld id="{E053DD94-EF7D-4B46-90DA-1D86C84E35B6}" type="datetimeFigureOut">
               <a:rPr lang="en-US" smtClean="0"/>
-              <a:t>3/22/23</a:t>
+              <a:t>3/29/23</a:t>
             </a:fld>
             <a:endParaRPr lang="en-US"/>
           </a:p>
@@ -3007,7 +3007,7 @@
           <a:p>
             <a:fld id="{E053DD94-EF7D-4B46-90DA-1D86C84E35B6}" type="datetimeFigureOut">
               <a:rPr lang="en-US" smtClean="0"/>
-              <a:t>3/22/23</a:t>
+              <a:t>3/29/23</a:t>
             </a:fld>
             <a:endParaRPr lang="en-US"/>
           </a:p>
@@ -3433,7 +3433,7 @@
         </p:blipFill>
         <p:spPr>
           <a:xfrm>
-            <a:off x="177160" y="78621"/>
+            <a:off x="246321" y="149721"/>
             <a:ext cx="3657600" cy="2011680"/>
           </a:xfrm>
           <a:prstGeom prst="rect">
@@ -3462,7 +3462,7 @@
         </p:blipFill>
         <p:spPr>
           <a:xfrm>
-            <a:off x="176746" y="2060104"/>
+            <a:off x="246596" y="2012207"/>
             <a:ext cx="3657600" cy="2194560"/>
           </a:xfrm>
           <a:prstGeom prst="rect">
@@ -3491,7 +3491,7 @@
         </p:blipFill>
         <p:spPr>
           <a:xfrm>
-            <a:off x="177387" y="4357874"/>
+            <a:off x="247237" y="4309977"/>
             <a:ext cx="3656769" cy="2043589"/>
           </a:xfrm>
           <a:prstGeom prst="rect">
@@ -3513,7 +3513,7 @@
         </p:nvSpPr>
         <p:spPr>
           <a:xfrm>
-            <a:off x="411972" y="88402"/>
+            <a:off x="481822" y="179309"/>
             <a:ext cx="279244" cy="252377"/>
           </a:xfrm>
           <a:prstGeom prst="rect">
@@ -3550,7 +3550,7 @@
         </p:nvSpPr>
         <p:spPr>
           <a:xfrm>
-            <a:off x="404600" y="4297767"/>
+            <a:off x="474450" y="4249870"/>
             <a:ext cx="284052" cy="252377"/>
           </a:xfrm>
           <a:prstGeom prst="rect">
@@ -3587,7 +3587,7 @@
         </p:nvSpPr>
         <p:spPr>
           <a:xfrm rot="16200000">
-            <a:off x="-907269" y="5098225"/>
+            <a:off x="-903476" y="5050328"/>
             <a:ext cx="1987724" cy="215444"/>
           </a:xfrm>
           <a:prstGeom prst="rect">
@@ -3624,8 +3624,8 @@
         </p:nvSpPr>
         <p:spPr>
           <a:xfrm>
-            <a:off x="198101" y="4598074"/>
-            <a:ext cx="292068" cy="184666"/>
+            <a:off x="69425" y="4554573"/>
+            <a:ext cx="494687" cy="184666"/>
           </a:xfrm>
           <a:prstGeom prst="rect">
             <a:avLst/>
@@ -3638,11 +3638,12 @@
           </a:bodyPr>
           <a:lstStyle/>
           <a:p>
-            <a:r>
-              <a:rPr lang="en-US" sz="600" dirty="0">
+            <a:pPr algn="r"/>
+            <a:r>
+              <a:rPr lang="en-US" sz="600" spc="-30" dirty="0">
                 <a:latin typeface="Avenir Medium" panose="02000503020000020003" pitchFamily="2" charset="0"/>
               </a:rPr>
-              <a:t>1.0</a:t>
+              <a:t>1,000,000</a:t>
             </a:r>
           </a:p>
         </p:txBody>
@@ -3661,8 +3662,8 @@
         </p:nvSpPr>
         <p:spPr>
           <a:xfrm>
-            <a:off x="197601" y="5245837"/>
-            <a:ext cx="292068" cy="184666"/>
+            <a:off x="128982" y="5202336"/>
+            <a:ext cx="438262" cy="184666"/>
           </a:xfrm>
           <a:prstGeom prst="rect">
             <a:avLst/>
@@ -3675,11 +3676,12 @@
           </a:bodyPr>
           <a:lstStyle/>
           <a:p>
-            <a:r>
-              <a:rPr lang="en-US" sz="600" dirty="0">
+            <a:pPr algn="r"/>
+            <a:r>
+              <a:rPr lang="en-US" sz="600" spc="-30" dirty="0">
                 <a:latin typeface="Avenir Medium" panose="02000503020000020003" pitchFamily="2" charset="0"/>
               </a:rPr>
-              <a:t>0.5</a:t>
+              <a:t>500,000</a:t>
             </a:r>
           </a:p>
         </p:txBody>
@@ -3698,7 +3700,7 @@
         </p:nvSpPr>
         <p:spPr>
           <a:xfrm>
-            <a:off x="243885" y="5905273"/>
+            <a:off x="335715" y="5857376"/>
             <a:ext cx="227948" cy="184666"/>
           </a:xfrm>
           <a:prstGeom prst="rect">
@@ -3735,7 +3737,7 @@
         </p:nvSpPr>
         <p:spPr>
           <a:xfrm rot="16200000">
-            <a:off x="-669836" y="870648"/>
+            <a:off x="-666043" y="1003774"/>
             <a:ext cx="1508426" cy="215444"/>
           </a:xfrm>
           <a:prstGeom prst="rect">
@@ -3772,8 +3774,8 @@
         </p:nvSpPr>
         <p:spPr>
           <a:xfrm rot="16200000">
-            <a:off x="-918442" y="2889420"/>
-            <a:ext cx="2005677" cy="215444"/>
+            <a:off x="-774394" y="2851649"/>
+            <a:ext cx="1725175" cy="215444"/>
           </a:xfrm>
           <a:prstGeom prst="rect">
             <a:avLst/>
@@ -3781,16 +3783,17 @@
           <a:noFill/>
         </p:spPr>
         <p:txBody>
-          <a:bodyPr wrap="none" rtlCol="0">
+          <a:bodyPr wrap="square" rtlCol="0">
             <a:spAutoFit/>
           </a:bodyPr>
           <a:lstStyle/>
           <a:p>
+            <a:pPr algn="ctr"/>
             <a:r>
               <a:rPr lang="en-US" sz="800" spc="-30" dirty="0">
                 <a:latin typeface="Avenir Medium" panose="02000503020000020003" pitchFamily="2" charset="0"/>
               </a:rPr>
-              <a:t>Pop. within 1 km of wells  in burn areas  (n)</a:t>
+              <a:t>Population exposed (n)</a:t>
             </a:r>
           </a:p>
         </p:txBody>
@@ -3809,7 +3812,7 @@
         </p:nvSpPr>
         <p:spPr>
           <a:xfrm>
-            <a:off x="58156" y="361683"/>
+            <a:off x="141194" y="457284"/>
             <a:ext cx="421911" cy="184666"/>
           </a:xfrm>
           <a:prstGeom prst="rect">
@@ -3847,7 +3850,7 @@
         </p:nvSpPr>
         <p:spPr>
           <a:xfrm>
-            <a:off x="68258" y="762034"/>
+            <a:off x="138108" y="868407"/>
             <a:ext cx="421911" cy="184666"/>
           </a:xfrm>
           <a:prstGeom prst="rect">
@@ -3885,7 +3888,7 @@
         </p:nvSpPr>
         <p:spPr>
           <a:xfrm>
-            <a:off x="247705" y="1567557"/>
+            <a:off x="335139" y="1700656"/>
             <a:ext cx="227948" cy="184666"/>
           </a:xfrm>
           <a:prstGeom prst="rect">
@@ -3923,7 +3926,7 @@
         </p:nvSpPr>
         <p:spPr>
           <a:xfrm>
-            <a:off x="1737638" y="6233253"/>
+            <a:off x="1807488" y="6185356"/>
             <a:ext cx="747320" cy="215444"/>
           </a:xfrm>
           <a:prstGeom prst="rect">
@@ -3961,7 +3964,7 @@
         </p:nvSpPr>
         <p:spPr>
           <a:xfrm>
-            <a:off x="1780591" y="4104363"/>
+            <a:off x="1850441" y="4056466"/>
             <a:ext cx="396262" cy="215444"/>
           </a:xfrm>
           <a:prstGeom prst="rect">
@@ -3999,7 +4002,7 @@
         </p:nvSpPr>
         <p:spPr>
           <a:xfrm>
-            <a:off x="411972" y="2065948"/>
+            <a:off x="481822" y="2018051"/>
             <a:ext cx="268022" cy="252377"/>
           </a:xfrm>
           <a:prstGeom prst="rect">
@@ -4036,7 +4039,7 @@
         </p:nvSpPr>
         <p:spPr>
           <a:xfrm>
-            <a:off x="97023" y="1164151"/>
+            <a:off x="184457" y="1286360"/>
             <a:ext cx="378630" cy="184666"/>
           </a:xfrm>
           <a:prstGeom prst="rect">
@@ -4076,7 +4079,7 @@
         </p:nvSpPr>
         <p:spPr>
           <a:xfrm>
-            <a:off x="669770" y="4415111"/>
+            <a:off x="739620" y="4367214"/>
             <a:ext cx="137160" cy="137160"/>
           </a:xfrm>
           <a:prstGeom prst="rect">
@@ -4130,7 +4133,7 @@
         </p:nvSpPr>
         <p:spPr>
           <a:xfrm>
-            <a:off x="750264" y="4379449"/>
+            <a:off x="820114" y="4331552"/>
             <a:ext cx="2220761" cy="215444"/>
           </a:xfrm>
           <a:prstGeom prst="rect">
@@ -4168,7 +4171,7 @@
         </p:nvSpPr>
         <p:spPr>
           <a:xfrm>
-            <a:off x="750264" y="4578792"/>
+            <a:off x="820114" y="4530895"/>
             <a:ext cx="1811328" cy="215444"/>
           </a:xfrm>
           <a:prstGeom prst="rect">
@@ -4208,7 +4211,7 @@
         </p:nvSpPr>
         <p:spPr>
           <a:xfrm>
-            <a:off x="669770" y="4613652"/>
+            <a:off x="739620" y="4565755"/>
             <a:ext cx="137160" cy="136627"/>
           </a:xfrm>
           <a:prstGeom prst="rect">
@@ -4264,7 +4267,7 @@
         </p:nvSpPr>
         <p:spPr>
           <a:xfrm>
-            <a:off x="3657875" y="3939392"/>
+            <a:off x="3727725" y="3891495"/>
             <a:ext cx="176746" cy="133399"/>
           </a:xfrm>
           <a:prstGeom prst="rect">
@@ -4318,7 +4321,7 @@
         </p:nvSpPr>
         <p:spPr>
           <a:xfrm>
-            <a:off x="64349" y="2163333"/>
+            <a:off x="138595" y="2125085"/>
             <a:ext cx="421910" cy="184666"/>
           </a:xfrm>
           <a:prstGeom prst="rect">
@@ -4356,7 +4359,7 @@
         </p:nvSpPr>
         <p:spPr>
           <a:xfrm>
-            <a:off x="257788" y="3810782"/>
+            <a:off x="332034" y="3779496"/>
             <a:ext cx="227948" cy="184666"/>
           </a:xfrm>
           <a:prstGeom prst="rect">
@@ -4394,7 +4397,7 @@
         </p:nvSpPr>
         <p:spPr>
           <a:xfrm>
-            <a:off x="68257" y="2494458"/>
+            <a:off x="138107" y="2452365"/>
             <a:ext cx="421911" cy="184666"/>
           </a:xfrm>
           <a:prstGeom prst="rect">
@@ -4432,7 +4435,7 @@
         </p:nvSpPr>
         <p:spPr>
           <a:xfrm>
-            <a:off x="67759" y="2820041"/>
+            <a:off x="142005" y="2791965"/>
             <a:ext cx="421910" cy="184666"/>
           </a:xfrm>
           <a:prstGeom prst="rect">
@@ -4470,7 +4473,7 @@
         </p:nvSpPr>
         <p:spPr>
           <a:xfrm>
-            <a:off x="66691" y="3145112"/>
+            <a:off x="140937" y="3124456"/>
             <a:ext cx="421911" cy="184666"/>
           </a:xfrm>
           <a:prstGeom prst="rect">
@@ -4508,7 +4511,7 @@
         </p:nvSpPr>
         <p:spPr>
           <a:xfrm>
-            <a:off x="66692" y="3481219"/>
+            <a:off x="140938" y="3447554"/>
             <a:ext cx="421910" cy="184666"/>
           </a:xfrm>
           <a:prstGeom prst="rect">
@@ -4532,163 +4535,90 @@
           </a:p>
         </p:txBody>
       </p:sp>
-      <p:grpSp>
-        <p:nvGrpSpPr>
-          <p:cNvPr id="42" name="Group 41">
+      <p:sp>
+        <p:nvSpPr>
+          <p:cNvPr id="34" name="TextBox 33">
             <a:extLst>
               <a:ext uri="{FF2B5EF4-FFF2-40B4-BE49-F238E27FC236}">
-                <a16:creationId xmlns:a16="http://schemas.microsoft.com/office/drawing/2014/main" id="{E879EEBD-8B15-ACDD-85F9-27CCCFB89E38}"/>
+                <a16:creationId xmlns:a16="http://schemas.microsoft.com/office/drawing/2014/main" id="{53AF0BC8-39CD-2CE2-8C65-5F7E0D659FB6}"/>
               </a:ext>
             </a:extLst>
           </p:cNvPr>
-          <p:cNvGrpSpPr/>
+          <p:cNvSpPr txBox="1"/>
           <p:nvPr/>
-        </p:nvGrpSpPr>
-        <p:grpSpPr>
-          <a:xfrm>
-            <a:off x="924946" y="157830"/>
-            <a:ext cx="805445" cy="184666"/>
-            <a:chOff x="594657" y="387499"/>
-            <a:chExt cx="805445" cy="184666"/>
-          </a:xfrm>
-        </p:grpSpPr>
-        <p:sp>
-          <p:nvSpPr>
-            <p:cNvPr id="34" name="TextBox 33">
-              <a:extLst>
-                <a:ext uri="{FF2B5EF4-FFF2-40B4-BE49-F238E27FC236}">
-                  <a16:creationId xmlns:a16="http://schemas.microsoft.com/office/drawing/2014/main" id="{53AF0BC8-39CD-2CE2-8C65-5F7E0D659FB6}"/>
-                </a:ext>
-              </a:extLst>
-            </p:cNvPr>
-            <p:cNvSpPr txBox="1"/>
-            <p:nvPr/>
-          </p:nvSpPr>
-          <p:spPr>
-            <a:xfrm>
-              <a:off x="821097" y="387499"/>
-              <a:ext cx="579005" cy="184666"/>
-            </a:xfrm>
-            <a:prstGeom prst="rect">
-              <a:avLst/>
-            </a:prstGeom>
-            <a:noFill/>
-          </p:spPr>
-          <p:txBody>
-            <a:bodyPr wrap="none" rtlCol="0">
-              <a:spAutoFit/>
-            </a:bodyPr>
-            <a:lstStyle/>
-            <a:p>
-              <a:r>
-                <a:rPr lang="en-US" sz="600" dirty="0">
-                  <a:latin typeface="Avenir Medium" panose="02000503020000020003" pitchFamily="2" charset="0"/>
-                </a:rPr>
-                <a:t>Best fit line</a:t>
-              </a:r>
-            </a:p>
-          </p:txBody>
-        </p:sp>
-        <p:sp>
-          <p:nvSpPr>
-            <p:cNvPr id="35" name="Rectangle 34">
-              <a:extLst>
-                <a:ext uri="{FF2B5EF4-FFF2-40B4-BE49-F238E27FC236}">
-                  <a16:creationId xmlns:a16="http://schemas.microsoft.com/office/drawing/2014/main" id="{DF854779-8904-6DAB-BB37-FB76CD96B0FB}"/>
-                </a:ext>
-              </a:extLst>
-            </p:cNvPr>
-            <p:cNvSpPr/>
-            <p:nvPr/>
-          </p:nvSpPr>
-          <p:spPr>
-            <a:xfrm>
-              <a:off x="594657" y="427287"/>
-              <a:ext cx="279244" cy="95658"/>
-            </a:xfrm>
-            <a:prstGeom prst="rect">
-              <a:avLst/>
-            </a:prstGeom>
+        </p:nvSpPr>
+        <p:spPr>
+          <a:xfrm>
+            <a:off x="1166817" y="258556"/>
+            <a:ext cx="537327" cy="184666"/>
+          </a:xfrm>
+          <a:prstGeom prst="rect">
+            <a:avLst/>
+          </a:prstGeom>
+          <a:noFill/>
+        </p:spPr>
+        <p:txBody>
+          <a:bodyPr wrap="none" rtlCol="0">
+            <a:spAutoFit/>
+          </a:bodyPr>
+          <a:lstStyle/>
+          <a:p>
+            <a:r>
+              <a:rPr lang="en-US" sz="600" dirty="0">
+                <a:latin typeface="Avenir Medium" panose="02000503020000020003" pitchFamily="2" charset="0"/>
+              </a:rPr>
+              <a:t>Trend line</a:t>
+            </a:r>
+          </a:p>
+        </p:txBody>
+      </p:sp>
+      <p:cxnSp>
+        <p:nvCxnSpPr>
+          <p:cNvPr id="37" name="Straight Connector 36">
+            <a:extLst>
+              <a:ext uri="{FF2B5EF4-FFF2-40B4-BE49-F238E27FC236}">
+                <a16:creationId xmlns:a16="http://schemas.microsoft.com/office/drawing/2014/main" id="{AC750879-B99C-4F6A-FB56-17AEB5F04A60}"/>
+              </a:ext>
+            </a:extLst>
+          </p:cNvPr>
+          <p:cNvCxnSpPr>
+            <a:cxnSpLocks/>
+          </p:cNvCxnSpPr>
+          <p:nvPr/>
+        </p:nvCxnSpPr>
+        <p:spPr>
+          <a:xfrm>
+            <a:off x="946404" y="343537"/>
+            <a:ext cx="286933" cy="0"/>
+          </a:xfrm>
+          <a:prstGeom prst="line">
+            <a:avLst/>
+          </a:prstGeom>
+          <a:ln w="9525">
             <a:solidFill>
-              <a:srgbClr val="E2E2E2"/>
+              <a:schemeClr val="tx1">
+                <a:lumMod val="95000"/>
+                <a:lumOff val="5000"/>
+              </a:schemeClr>
             </a:solidFill>
-            <a:ln>
-              <a:noFill/>
-            </a:ln>
-          </p:spPr>
-          <p:style>
-            <a:lnRef idx="2">
-              <a:schemeClr val="accent1">
-                <a:shade val="50000"/>
-              </a:schemeClr>
-            </a:lnRef>
-            <a:fillRef idx="1">
-              <a:schemeClr val="accent1"/>
-            </a:fillRef>
-            <a:effectRef idx="0">
-              <a:schemeClr val="accent1"/>
-            </a:effectRef>
-            <a:fontRef idx="minor">
-              <a:schemeClr val="lt1"/>
-            </a:fontRef>
-          </p:style>
-          <p:txBody>
-            <a:bodyPr rtlCol="0" anchor="ctr"/>
-            <a:lstStyle/>
-            <a:p>
-              <a:pPr algn="ctr"/>
-              <a:endParaRPr lang="en-US"/>
-            </a:p>
-          </p:txBody>
-        </p:sp>
-        <p:cxnSp>
-          <p:nvCxnSpPr>
-            <p:cNvPr id="37" name="Straight Connector 36">
-              <a:extLst>
-                <a:ext uri="{FF2B5EF4-FFF2-40B4-BE49-F238E27FC236}">
-                  <a16:creationId xmlns:a16="http://schemas.microsoft.com/office/drawing/2014/main" id="{AC750879-B99C-4F6A-FB56-17AEB5F04A60}"/>
-                </a:ext>
-              </a:extLst>
-            </p:cNvPr>
-            <p:cNvCxnSpPr>
-              <a:cxnSpLocks/>
-            </p:cNvCxnSpPr>
-            <p:nvPr/>
-          </p:nvCxnSpPr>
-          <p:spPr>
-            <a:xfrm>
-              <a:off x="594657" y="472480"/>
-              <a:ext cx="279244" cy="0"/>
-            </a:xfrm>
-            <a:prstGeom prst="line">
-              <a:avLst/>
-            </a:prstGeom>
-            <a:ln>
-              <a:solidFill>
-                <a:schemeClr val="tx1">
-                  <a:lumMod val="95000"/>
-                  <a:lumOff val="5000"/>
-                </a:schemeClr>
-              </a:solidFill>
-              <a:prstDash val="lgDash"/>
-            </a:ln>
-          </p:spPr>
-          <p:style>
-            <a:lnRef idx="1">
-              <a:schemeClr val="accent1"/>
-            </a:lnRef>
-            <a:fillRef idx="0">
-              <a:schemeClr val="accent1"/>
-            </a:fillRef>
-            <a:effectRef idx="0">
-              <a:schemeClr val="accent1"/>
-            </a:effectRef>
-            <a:fontRef idx="minor">
-              <a:schemeClr val="tx1"/>
-            </a:fontRef>
-          </p:style>
-        </p:cxnSp>
-      </p:grpSp>
+            <a:prstDash val="lgDash"/>
+          </a:ln>
+        </p:spPr>
+        <p:style>
+          <a:lnRef idx="1">
+            <a:schemeClr val="accent1"/>
+          </a:lnRef>
+          <a:fillRef idx="0">
+            <a:schemeClr val="accent1"/>
+          </a:fillRef>
+          <a:effectRef idx="0">
+            <a:schemeClr val="accent1"/>
+          </a:effectRef>
+          <a:fontRef idx="minor">
+            <a:schemeClr val="tx1"/>
+          </a:fontRef>
+        </p:style>
+      </p:cxnSp>
       <p:sp>
         <p:nvSpPr>
           <p:cNvPr id="19" name="TextBox 18">
@@ -4703,7 +4633,7 @@
         </p:nvSpPr>
         <p:spPr>
           <a:xfrm>
-            <a:off x="927626" y="3967434"/>
+            <a:off x="997476" y="3919537"/>
             <a:ext cx="415499" cy="215444"/>
           </a:xfrm>
           <a:prstGeom prst="rect">
@@ -4741,7 +4671,7 @@
         </p:nvSpPr>
         <p:spPr>
           <a:xfrm>
-            <a:off x="1765734" y="3968400"/>
+            <a:off x="1835584" y="3920503"/>
             <a:ext cx="415499" cy="215444"/>
           </a:xfrm>
           <a:prstGeom prst="rect">
@@ -4779,7 +4709,7 @@
         </p:nvSpPr>
         <p:spPr>
           <a:xfrm>
-            <a:off x="2612466" y="3964070"/>
+            <a:off x="2682316" y="3916173"/>
             <a:ext cx="415499" cy="215444"/>
           </a:xfrm>
           <a:prstGeom prst="rect">

</xml_diff>